<commit_message>
Cambios antes de la presentacion xd
</commit_message>
<xml_diff>
--- a/Presentacion.pptx
+++ b/Presentacion.pptx
@@ -5,36 +5,37 @@
     <p:sldMasterId id="2147483665" r:id="rId4"/>
   </p:sldMasterIdLst>
   <p:notesMasterIdLst>
-    <p:notesMasterId r:id="rId15"/>
+    <p:notesMasterId r:id="rId16"/>
   </p:notesMasterIdLst>
   <p:sldIdLst>
     <p:sldId id="256" r:id="rId5"/>
     <p:sldId id="258" r:id="rId6"/>
-    <p:sldId id="261" r:id="rId7"/>
-    <p:sldId id="289" r:id="rId8"/>
-    <p:sldId id="290" r:id="rId9"/>
-    <p:sldId id="287" r:id="rId10"/>
-    <p:sldId id="288" r:id="rId11"/>
-    <p:sldId id="274" r:id="rId12"/>
-    <p:sldId id="286" r:id="rId13"/>
-    <p:sldId id="279" r:id="rId14"/>
+    <p:sldId id="287" r:id="rId7"/>
+    <p:sldId id="261" r:id="rId8"/>
+    <p:sldId id="289" r:id="rId9"/>
+    <p:sldId id="290" r:id="rId10"/>
+    <p:sldId id="274" r:id="rId11"/>
+    <p:sldId id="286" r:id="rId12"/>
+    <p:sldId id="292" r:id="rId13"/>
+    <p:sldId id="291" r:id="rId14"/>
+    <p:sldId id="279" r:id="rId15"/>
   </p:sldIdLst>
   <p:sldSz cx="9144000" cy="5143500" type="screen16x9"/>
   <p:notesSz cx="6858000" cy="9144000"/>
   <p:embeddedFontLst>
     <p:embeddedFont>
       <p:font typeface="Montserrat" panose="020B0604020202020204" charset="0"/>
-      <p:regular r:id="rId16"/>
-      <p:bold r:id="rId17"/>
-      <p:italic r:id="rId18"/>
-      <p:boldItalic r:id="rId19"/>
+      <p:regular r:id="rId17"/>
+      <p:bold r:id="rId18"/>
+      <p:italic r:id="rId19"/>
+      <p:boldItalic r:id="rId20"/>
     </p:embeddedFont>
     <p:embeddedFont>
-      <p:font typeface="Open Sans" panose="020B0604020202020204" charset="0"/>
-      <p:regular r:id="rId20"/>
-      <p:bold r:id="rId21"/>
-      <p:italic r:id="rId22"/>
-      <p:boldItalic r:id="rId23"/>
+      <p:font typeface="Open Sans" panose="020B0606030504020204" pitchFamily="34" charset="0"/>
+      <p:regular r:id="rId21"/>
+      <p:bold r:id="rId22"/>
+      <p:italic r:id="rId23"/>
+      <p:boldItalic r:id="rId24"/>
     </p:embeddedFont>
   </p:embeddedFontLst>
   <p:defaultTextStyle>
@@ -266,6 +267,11 @@
       </a:defRPr>
     </a:lvl9pPr>
   </p:defaultTextStyle>
+  <p:extLst>
+    <p:ext uri="{EFAFB233-063F-42B5-8137-9DF3F51BA10A}">
+      <p15:sldGuideLst xmlns:p15="http://schemas.microsoft.com/office/powerpoint/2012/main"/>
+    </p:ext>
+  </p:extLst>
 </p:presentation>
 </file>
 
@@ -819,6 +825,115 @@
   <p:cSld>
     <p:spTree>
       <p:nvGrpSpPr>
+        <p:cNvPr id="1" name="Shape 282"/>
+        <p:cNvGrpSpPr/>
+        <p:nvPr/>
+      </p:nvGrpSpPr>
+      <p:grpSpPr>
+        <a:xfrm>
+          <a:off x="0" y="0"/>
+          <a:ext cx="0" cy="0"/>
+          <a:chOff x="0" y="0"/>
+          <a:chExt cx="0" cy="0"/>
+        </a:xfrm>
+      </p:grpSpPr>
+      <p:sp>
+        <p:nvSpPr>
+          <p:cNvPr id="283" name="Google Shape;283;g35ed75ccf_057:notes"/>
+          <p:cNvSpPr>
+            <a:spLocks noGrp="1" noRot="1" noChangeAspect="1"/>
+          </p:cNvSpPr>
+          <p:nvPr>
+            <p:ph type="sldImg" idx="2"/>
+          </p:nvPr>
+        </p:nvSpPr>
+        <p:spPr>
+          <a:xfrm>
+            <a:off x="381000" y="685800"/>
+            <a:ext cx="6096000" cy="3429000"/>
+          </a:xfrm>
+          <a:custGeom>
+            <a:avLst/>
+            <a:gdLst/>
+            <a:ahLst/>
+            <a:cxnLst/>
+            <a:rect l="l" t="t" r="r" b="b"/>
+            <a:pathLst>
+              <a:path w="120000" h="120000" extrusionOk="0">
+                <a:moveTo>
+                  <a:pt x="0" y="0"/>
+                </a:moveTo>
+                <a:lnTo>
+                  <a:pt x="120000" y="0"/>
+                </a:lnTo>
+                <a:lnTo>
+                  <a:pt x="120000" y="120000"/>
+                </a:lnTo>
+                <a:lnTo>
+                  <a:pt x="0" y="120000"/>
+                </a:lnTo>
+                <a:close/>
+              </a:path>
+            </a:pathLst>
+          </a:custGeom>
+        </p:spPr>
+      </p:sp>
+      <p:sp>
+        <p:nvSpPr>
+          <p:cNvPr id="284" name="Google Shape;284;g35ed75ccf_057:notes"/>
+          <p:cNvSpPr txBox="1">
+            <a:spLocks noGrp="1"/>
+          </p:cNvSpPr>
+          <p:nvPr>
+            <p:ph type="body" idx="1"/>
+          </p:nvPr>
+        </p:nvSpPr>
+        <p:spPr>
+          <a:xfrm>
+            <a:off x="685800" y="4343400"/>
+            <a:ext cx="5486400" cy="4114800"/>
+          </a:xfrm>
+          <a:prstGeom prst="rect">
+            <a:avLst/>
+          </a:prstGeom>
+        </p:spPr>
+        <p:txBody>
+          <a:bodyPr spcFirstLastPara="1" wrap="square" lIns="91425" tIns="91425" rIns="91425" bIns="91425" anchor="t" anchorCtr="0">
+            <a:noAutofit/>
+          </a:bodyPr>
+          <a:lstStyle/>
+          <a:p>
+            <a:pPr marL="0" lvl="0" indent="0" algn="l" rtl="0">
+              <a:spcBef>
+                <a:spcPts val="0"/>
+              </a:spcBef>
+              <a:spcAft>
+                <a:spcPts val="0"/>
+              </a:spcAft>
+              <a:buNone/>
+            </a:pPr>
+            <a:endParaRPr/>
+          </a:p>
+        </p:txBody>
+      </p:sp>
+    </p:spTree>
+    <p:extLst>
+      <p:ext uri="{BB962C8B-B14F-4D97-AF65-F5344CB8AC3E}">
+        <p14:creationId xmlns:p14="http://schemas.microsoft.com/office/powerpoint/2010/main" val="2301996266"/>
+      </p:ext>
+    </p:extLst>
+  </p:cSld>
+  <p:clrMapOvr>
+    <a:masterClrMapping/>
+  </p:clrMapOvr>
+</p:notes>
+</file>
+
+<file path=ppt/notesSlides/notesSlide11.xml><?xml version="1.0" encoding="utf-8"?>
+<p:notes xmlns:a="http://schemas.openxmlformats.org/drawingml/2006/main" xmlns:r="http://schemas.openxmlformats.org/officeDocument/2006/relationships" xmlns:p="http://schemas.openxmlformats.org/presentationml/2006/main" showMasterSp="0" showMasterPhAnim="0">
+  <p:cSld>
+    <p:spTree>
+      <p:nvGrpSpPr>
         <p:cNvPr id="1" name="Shape 373"/>
         <p:cNvGrpSpPr/>
         <p:nvPr/>
@@ -1119,6 +1234,11 @@
         </p:txBody>
       </p:sp>
     </p:spTree>
+    <p:extLst>
+      <p:ext uri="{BB962C8B-B14F-4D97-AF65-F5344CB8AC3E}">
+        <p14:creationId xmlns:p14="http://schemas.microsoft.com/office/powerpoint/2010/main" val="4099830753"/>
+      </p:ext>
+    </p:extLst>
   </p:cSld>
   <p:clrMapOvr>
     <a:masterClrMapping/>
@@ -1223,11 +1343,6 @@
         </p:txBody>
       </p:sp>
     </p:spTree>
-    <p:extLst>
-      <p:ext uri="{BB962C8B-B14F-4D97-AF65-F5344CB8AC3E}">
-        <p14:creationId xmlns:p14="http://schemas.microsoft.com/office/powerpoint/2010/main" val="1316434279"/>
-      </p:ext>
-    </p:extLst>
   </p:cSld>
   <p:clrMapOvr>
     <a:masterClrMapping/>
@@ -1334,7 +1449,7 @@
     </p:spTree>
     <p:extLst>
       <p:ext uri="{BB962C8B-B14F-4D97-AF65-F5344CB8AC3E}">
-        <p14:creationId xmlns:p14="http://schemas.microsoft.com/office/powerpoint/2010/main" val="1331874220"/>
+        <p14:creationId xmlns:p14="http://schemas.microsoft.com/office/powerpoint/2010/main" val="1316434279"/>
       </p:ext>
     </p:extLst>
   </p:cSld>
@@ -1443,7 +1558,7 @@
     </p:spTree>
     <p:extLst>
       <p:ext uri="{BB962C8B-B14F-4D97-AF65-F5344CB8AC3E}">
-        <p14:creationId xmlns:p14="http://schemas.microsoft.com/office/powerpoint/2010/main" val="4099830753"/>
+        <p14:creationId xmlns:p14="http://schemas.microsoft.com/office/powerpoint/2010/main" val="1331874220"/>
       </p:ext>
     </p:extLst>
   </p:cSld>
@@ -1458,7 +1573,7 @@
   <p:cSld>
     <p:spTree>
       <p:nvGrpSpPr>
-        <p:cNvPr id="1" name="Shape 126"/>
+        <p:cNvPr id="1" name="Shape 282"/>
         <p:cNvGrpSpPr/>
         <p:nvPr/>
       </p:nvGrpSpPr>
@@ -1472,7 +1587,7 @@
       </p:grpSpPr>
       <p:sp>
         <p:nvSpPr>
-          <p:cNvPr id="127" name="Google Shape;127;p:notes"/>
+          <p:cNvPr id="283" name="Google Shape;283;g35ed75ccf_057:notes"/>
           <p:cNvSpPr>
             <a:spLocks noGrp="1" noRot="1" noChangeAspect="1"/>
           </p:cNvSpPr>
@@ -1513,7 +1628,7 @@
       </p:sp>
       <p:sp>
         <p:nvSpPr>
-          <p:cNvPr id="128" name="Google Shape;128;p:notes"/>
+          <p:cNvPr id="284" name="Google Shape;284;g35ed75ccf_057:notes"/>
           <p:cNvSpPr txBox="1">
             <a:spLocks noGrp="1"/>
           </p:cNvSpPr>
@@ -1550,11 +1665,6 @@
         </p:txBody>
       </p:sp>
     </p:spTree>
-    <p:extLst>
-      <p:ext uri="{BB962C8B-B14F-4D97-AF65-F5344CB8AC3E}">
-        <p14:creationId xmlns:p14="http://schemas.microsoft.com/office/powerpoint/2010/main" val="625196204"/>
-      </p:ext>
-    </p:extLst>
   </p:cSld>
   <p:clrMapOvr>
     <a:masterClrMapping/>
@@ -1659,6 +1769,11 @@
         </p:txBody>
       </p:sp>
     </p:spTree>
+    <p:extLst>
+      <p:ext uri="{BB962C8B-B14F-4D97-AF65-F5344CB8AC3E}">
+        <p14:creationId xmlns:p14="http://schemas.microsoft.com/office/powerpoint/2010/main" val="3652738642"/>
+      </p:ext>
+    </p:extLst>
   </p:cSld>
   <p:clrMapOvr>
     <a:masterClrMapping/>
@@ -1765,7 +1880,7 @@
     </p:spTree>
     <p:extLst>
       <p:ext uri="{BB962C8B-B14F-4D97-AF65-F5344CB8AC3E}">
-        <p14:creationId xmlns:p14="http://schemas.microsoft.com/office/powerpoint/2010/main" val="3652738642"/>
+        <p14:creationId xmlns:p14="http://schemas.microsoft.com/office/powerpoint/2010/main" val="2429548210"/>
       </p:ext>
     </p:extLst>
   </p:cSld>
@@ -2419,7 +2534,7 @@
             </a:pPr>
             <a:fld id="{00000000-1234-1234-1234-123412341234}" type="slidenum">
               <a:rPr lang="en"/>
-              <a:t>‹Nº›</a:t>
+              <a:t>‹#›</a:t>
             </a:fld>
             <a:endParaRPr/>
           </a:p>
@@ -2790,7 +2905,7 @@
             </a:pPr>
             <a:fld id="{00000000-1234-1234-1234-123412341234}" type="slidenum">
               <a:rPr lang="en"/>
-              <a:t>‹Nº›</a:t>
+              <a:t>‹#›</a:t>
             </a:fld>
             <a:endParaRPr/>
           </a:p>
@@ -3192,7 +3307,7 @@
             </a:pPr>
             <a:fld id="{00000000-1234-1234-1234-123412341234}" type="slidenum">
               <a:rPr lang="en"/>
-              <a:t>‹Nº›</a:t>
+              <a:t>‹#›</a:t>
             </a:fld>
             <a:endParaRPr/>
           </a:p>
@@ -3296,7 +3411,7 @@
             </a:pPr>
             <a:fld id="{00000000-1234-1234-1234-123412341234}" type="slidenum">
               <a:rPr lang="en"/>
-              <a:t>‹Nº›</a:t>
+              <a:t>‹#›</a:t>
             </a:fld>
             <a:endParaRPr/>
           </a:p>
@@ -4045,7 +4160,7 @@
             </a:pPr>
             <a:fld id="{00000000-1234-1234-1234-123412341234}" type="slidenum">
               <a:rPr lang="en"/>
-              <a:t>‹Nº›</a:t>
+              <a:t>‹#›</a:t>
             </a:fld>
             <a:endParaRPr/>
           </a:p>
@@ -4238,7 +4353,7 @@
             </a:pPr>
             <a:fld id="{00000000-1234-1234-1234-123412341234}" type="slidenum">
               <a:rPr lang="en"/>
-              <a:t>‹Nº›</a:t>
+              <a:t>‹#›</a:t>
             </a:fld>
             <a:endParaRPr/>
           </a:p>
@@ -4350,7 +4465,7 @@
             </a:pPr>
             <a:fld id="{00000000-1234-1234-1234-123412341234}" type="slidenum">
               <a:rPr lang="en"/>
-              <a:t>‹Nº›</a:t>
+              <a:t>‹#›</a:t>
             </a:fld>
             <a:endParaRPr/>
           </a:p>
@@ -5020,7 +5135,7 @@
             </a:pPr>
             <a:fld id="{00000000-1234-1234-1234-123412341234}" type="slidenum">
               <a:rPr lang="en"/>
-              <a:t>‹Nº›</a:t>
+              <a:t>‹#›</a:t>
             </a:fld>
             <a:endParaRPr/>
           </a:p>
@@ -5794,36 +5909,6 @@
           </a:p>
         </p:txBody>
       </p:sp>
-      <p:pic>
-        <p:nvPicPr>
-          <p:cNvPr id="5" name="Imagen 4">
-            <a:extLst>
-              <a:ext uri="{FF2B5EF4-FFF2-40B4-BE49-F238E27FC236}">
-                <a16:creationId xmlns:a16="http://schemas.microsoft.com/office/drawing/2014/main" id="{362CF413-E0E4-44DA-A0E6-87F00C81ACD8}"/>
-              </a:ext>
-            </a:extLst>
-          </p:cNvPr>
-          <p:cNvPicPr>
-            <a:picLocks noChangeAspect="1"/>
-          </p:cNvPicPr>
-          <p:nvPr/>
-        </p:nvPicPr>
-        <p:blipFill>
-          <a:blip r:embed="rId3"/>
-          <a:stretch>
-            <a:fillRect/>
-          </a:stretch>
-        </p:blipFill>
-        <p:spPr>
-          <a:xfrm>
-            <a:off x="694401" y="355267"/>
-            <a:ext cx="4518671" cy="2520571"/>
-          </a:xfrm>
-          <a:prstGeom prst="rect">
-            <a:avLst/>
-          </a:prstGeom>
-        </p:spPr>
-      </p:pic>
       <p:sp>
         <p:nvSpPr>
           <p:cNvPr id="7" name="Google Shape;109;p21">
@@ -6124,18 +6209,6 @@
               <a:buNone/>
             </a:pPr>
             <a:r>
-              <a:rPr lang="es-MX" b="1" dirty="0" err="1">
-                <a:solidFill>
-                  <a:srgbClr val="FFC800"/>
-                </a:solidFill>
-                <a:latin typeface="Montserrat"/>
-                <a:ea typeface="Montserrat"/>
-                <a:cs typeface="Montserrat"/>
-                <a:sym typeface="Montserrat"/>
-              </a:rPr>
-              <a:t>Yeisson</a:t>
-            </a:r>
-            <a:r>
               <a:rPr lang="es-MX" b="1" dirty="0">
                 <a:solidFill>
                   <a:srgbClr val="FFC800"/>
@@ -6145,29 +6218,8 @@
                 <a:cs typeface="Montserrat"/>
                 <a:sym typeface="Montserrat"/>
               </a:rPr>
-              <a:t> </a:t>
+              <a:t>Yeisson Gualdrón</a:t>
             </a:r>
-            <a:r>
-              <a:rPr lang="es-MX" b="1" dirty="0" err="1">
-                <a:solidFill>
-                  <a:srgbClr val="FFC800"/>
-                </a:solidFill>
-                <a:latin typeface="Montserrat"/>
-                <a:ea typeface="Montserrat"/>
-                <a:cs typeface="Montserrat"/>
-                <a:sym typeface="Montserrat"/>
-              </a:rPr>
-              <a:t>Gualdrón</a:t>
-            </a:r>
-            <a:endParaRPr lang="es-MX" b="1" dirty="0">
-              <a:solidFill>
-                <a:srgbClr val="FFC800"/>
-              </a:solidFill>
-              <a:latin typeface="Montserrat"/>
-              <a:ea typeface="Montserrat"/>
-              <a:cs typeface="Montserrat"/>
-              <a:sym typeface="Montserrat"/>
-            </a:endParaRPr>
           </a:p>
           <a:p>
             <a:pPr marL="0" indent="0">
@@ -6218,6 +6270,36 @@
           </a:p>
         </p:txBody>
       </p:sp>
+      <p:pic>
+        <p:nvPicPr>
+          <p:cNvPr id="3" name="Picture 2">
+            <a:extLst>
+              <a:ext uri="{FF2B5EF4-FFF2-40B4-BE49-F238E27FC236}">
+                <a16:creationId xmlns:a16="http://schemas.microsoft.com/office/drawing/2014/main" id="{7F4C5402-D866-4D4B-8669-AF7500063299}"/>
+              </a:ext>
+            </a:extLst>
+          </p:cNvPr>
+          <p:cNvPicPr>
+            <a:picLocks noChangeAspect="1"/>
+          </p:cNvPicPr>
+          <p:nvPr/>
+        </p:nvPicPr>
+        <p:blipFill>
+          <a:blip r:embed="rId3"/>
+          <a:stretch>
+            <a:fillRect/>
+          </a:stretch>
+        </p:blipFill>
+        <p:spPr>
+          <a:xfrm>
+            <a:off x="462492" y="1056347"/>
+            <a:ext cx="5176733" cy="1187999"/>
+          </a:xfrm>
+          <a:prstGeom prst="rect">
+            <a:avLst/>
+          </a:prstGeom>
+        </p:spPr>
+      </p:pic>
     </p:spTree>
   </p:cSld>
   <p:clrMapOvr>
@@ -6227,6 +6309,508 @@
 </file>
 
 <file path=ppt/slides/slide10.xml><?xml version="1.0" encoding="utf-8"?>
+<p:sld xmlns:a="http://schemas.openxmlformats.org/drawingml/2006/main" xmlns:r="http://schemas.openxmlformats.org/officeDocument/2006/relationships" xmlns:p="http://schemas.openxmlformats.org/presentationml/2006/main">
+  <p:cSld>
+    <p:spTree>
+      <p:nvGrpSpPr>
+        <p:cNvPr id="1" name="Shape 285"/>
+        <p:cNvGrpSpPr/>
+        <p:nvPr/>
+      </p:nvGrpSpPr>
+      <p:grpSpPr>
+        <a:xfrm>
+          <a:off x="0" y="0"/>
+          <a:ext cx="0" cy="0"/>
+          <a:chOff x="0" y="0"/>
+          <a:chExt cx="0" cy="0"/>
+        </a:xfrm>
+      </p:grpSpPr>
+      <p:sp>
+        <p:nvSpPr>
+          <p:cNvPr id="63" name="Google Shape;331;p35">
+            <a:extLst>
+              <a:ext uri="{FF2B5EF4-FFF2-40B4-BE49-F238E27FC236}">
+                <a16:creationId xmlns:a16="http://schemas.microsoft.com/office/drawing/2014/main" id="{9E78A624-48D3-4C9D-85E3-FD4EEFB9017F}"/>
+              </a:ext>
+            </a:extLst>
+          </p:cNvPr>
+          <p:cNvSpPr/>
+          <p:nvPr/>
+        </p:nvSpPr>
+        <p:spPr>
+          <a:xfrm>
+            <a:off x="1148006" y="488137"/>
+            <a:ext cx="6506878" cy="4364739"/>
+          </a:xfrm>
+          <a:custGeom>
+            <a:avLst/>
+            <a:gdLst/>
+            <a:ahLst/>
+            <a:cxnLst/>
+            <a:rect l="l" t="t" r="r" b="b"/>
+            <a:pathLst>
+              <a:path w="143434" h="111665" extrusionOk="0">
+                <a:moveTo>
+                  <a:pt x="71751" y="2308"/>
+                </a:moveTo>
+                <a:lnTo>
+                  <a:pt x="71887" y="2376"/>
+                </a:lnTo>
+                <a:lnTo>
+                  <a:pt x="72091" y="2444"/>
+                </a:lnTo>
+                <a:lnTo>
+                  <a:pt x="72159" y="2647"/>
+                </a:lnTo>
+                <a:lnTo>
+                  <a:pt x="72226" y="2783"/>
+                </a:lnTo>
+                <a:lnTo>
+                  <a:pt x="72159" y="2987"/>
+                </a:lnTo>
+                <a:lnTo>
+                  <a:pt x="72091" y="3190"/>
+                </a:lnTo>
+                <a:lnTo>
+                  <a:pt x="71887" y="3258"/>
+                </a:lnTo>
+                <a:lnTo>
+                  <a:pt x="71751" y="3326"/>
+                </a:lnTo>
+                <a:lnTo>
+                  <a:pt x="71548" y="3258"/>
+                </a:lnTo>
+                <a:lnTo>
+                  <a:pt x="71344" y="3190"/>
+                </a:lnTo>
+                <a:lnTo>
+                  <a:pt x="71276" y="2987"/>
+                </a:lnTo>
+                <a:lnTo>
+                  <a:pt x="71208" y="2783"/>
+                </a:lnTo>
+                <a:lnTo>
+                  <a:pt x="71276" y="2647"/>
+                </a:lnTo>
+                <a:lnTo>
+                  <a:pt x="71344" y="2444"/>
+                </a:lnTo>
+                <a:lnTo>
+                  <a:pt x="71548" y="2376"/>
+                </a:lnTo>
+                <a:lnTo>
+                  <a:pt x="71751" y="2308"/>
+                </a:lnTo>
+                <a:close/>
+                <a:moveTo>
+                  <a:pt x="137528" y="5906"/>
+                </a:moveTo>
+                <a:lnTo>
+                  <a:pt x="137596" y="5974"/>
+                </a:lnTo>
+                <a:lnTo>
+                  <a:pt x="137596" y="89604"/>
+                </a:lnTo>
+                <a:lnTo>
+                  <a:pt x="5906" y="89604"/>
+                </a:lnTo>
+                <a:lnTo>
+                  <a:pt x="5906" y="5974"/>
+                </a:lnTo>
+                <a:lnTo>
+                  <a:pt x="5906" y="5906"/>
+                </a:lnTo>
+                <a:close/>
+                <a:moveTo>
+                  <a:pt x="3530" y="0"/>
+                </a:moveTo>
+                <a:lnTo>
+                  <a:pt x="3191" y="68"/>
+                </a:lnTo>
+                <a:lnTo>
+                  <a:pt x="2444" y="339"/>
+                </a:lnTo>
+                <a:lnTo>
+                  <a:pt x="1766" y="679"/>
+                </a:lnTo>
+                <a:lnTo>
+                  <a:pt x="1155" y="1154"/>
+                </a:lnTo>
+                <a:lnTo>
+                  <a:pt x="679" y="1765"/>
+                </a:lnTo>
+                <a:lnTo>
+                  <a:pt x="272" y="2444"/>
+                </a:lnTo>
+                <a:lnTo>
+                  <a:pt x="69" y="3190"/>
+                </a:lnTo>
+                <a:lnTo>
+                  <a:pt x="1" y="3598"/>
+                </a:lnTo>
+                <a:lnTo>
+                  <a:pt x="1" y="4005"/>
+                </a:lnTo>
+                <a:lnTo>
+                  <a:pt x="1" y="91572"/>
+                </a:lnTo>
+                <a:lnTo>
+                  <a:pt x="1" y="91979"/>
+                </a:lnTo>
+                <a:lnTo>
+                  <a:pt x="69" y="92319"/>
+                </a:lnTo>
+                <a:lnTo>
+                  <a:pt x="272" y="93065"/>
+                </a:lnTo>
+                <a:lnTo>
+                  <a:pt x="679" y="93744"/>
+                </a:lnTo>
+                <a:lnTo>
+                  <a:pt x="1155" y="94355"/>
+                </a:lnTo>
+                <a:lnTo>
+                  <a:pt x="1766" y="94830"/>
+                </a:lnTo>
+                <a:lnTo>
+                  <a:pt x="2444" y="95238"/>
+                </a:lnTo>
+                <a:lnTo>
+                  <a:pt x="3191" y="95441"/>
+                </a:lnTo>
+                <a:lnTo>
+                  <a:pt x="3530" y="95509"/>
+                </a:lnTo>
+                <a:lnTo>
+                  <a:pt x="139904" y="95509"/>
+                </a:lnTo>
+                <a:lnTo>
+                  <a:pt x="140311" y="95441"/>
+                </a:lnTo>
+                <a:lnTo>
+                  <a:pt x="141058" y="95238"/>
+                </a:lnTo>
+                <a:lnTo>
+                  <a:pt x="141737" y="94830"/>
+                </a:lnTo>
+                <a:lnTo>
+                  <a:pt x="142280" y="94355"/>
+                </a:lnTo>
+                <a:lnTo>
+                  <a:pt x="142755" y="93744"/>
+                </a:lnTo>
+                <a:lnTo>
+                  <a:pt x="143162" y="93065"/>
+                </a:lnTo>
+                <a:lnTo>
+                  <a:pt x="143366" y="92319"/>
+                </a:lnTo>
+                <a:lnTo>
+                  <a:pt x="143434" y="91979"/>
+                </a:lnTo>
+                <a:lnTo>
+                  <a:pt x="143434" y="91572"/>
+                </a:lnTo>
+                <a:lnTo>
+                  <a:pt x="143434" y="4005"/>
+                </a:lnTo>
+                <a:lnTo>
+                  <a:pt x="143434" y="3598"/>
+                </a:lnTo>
+                <a:lnTo>
+                  <a:pt x="143366" y="3190"/>
+                </a:lnTo>
+                <a:lnTo>
+                  <a:pt x="143162" y="2444"/>
+                </a:lnTo>
+                <a:lnTo>
+                  <a:pt x="142755" y="1765"/>
+                </a:lnTo>
+                <a:lnTo>
+                  <a:pt x="142280" y="1154"/>
+                </a:lnTo>
+                <a:lnTo>
+                  <a:pt x="141737" y="679"/>
+                </a:lnTo>
+                <a:lnTo>
+                  <a:pt x="141058" y="339"/>
+                </a:lnTo>
+                <a:lnTo>
+                  <a:pt x="140311" y="68"/>
+                </a:lnTo>
+                <a:lnTo>
+                  <a:pt x="139904" y="0"/>
+                </a:lnTo>
+                <a:close/>
+                <a:moveTo>
+                  <a:pt x="55324" y="95713"/>
+                </a:moveTo>
+                <a:lnTo>
+                  <a:pt x="55052" y="98971"/>
+                </a:lnTo>
+                <a:lnTo>
+                  <a:pt x="54713" y="102297"/>
+                </a:lnTo>
+                <a:lnTo>
+                  <a:pt x="54374" y="105284"/>
+                </a:lnTo>
+                <a:lnTo>
+                  <a:pt x="53966" y="107388"/>
+                </a:lnTo>
+                <a:lnTo>
+                  <a:pt x="53763" y="108203"/>
+                </a:lnTo>
+                <a:lnTo>
+                  <a:pt x="53627" y="108746"/>
+                </a:lnTo>
+                <a:lnTo>
+                  <a:pt x="53423" y="109153"/>
+                </a:lnTo>
+                <a:lnTo>
+                  <a:pt x="53220" y="109357"/>
+                </a:lnTo>
+                <a:lnTo>
+                  <a:pt x="52677" y="109493"/>
+                </a:lnTo>
+                <a:lnTo>
+                  <a:pt x="51794" y="109696"/>
+                </a:lnTo>
+                <a:lnTo>
+                  <a:pt x="49690" y="110036"/>
+                </a:lnTo>
+                <a:lnTo>
+                  <a:pt x="48061" y="110307"/>
+                </a:lnTo>
+                <a:lnTo>
+                  <a:pt x="47450" y="110443"/>
+                </a:lnTo>
+                <a:lnTo>
+                  <a:pt x="47110" y="110511"/>
+                </a:lnTo>
+                <a:lnTo>
+                  <a:pt x="47042" y="110579"/>
+                </a:lnTo>
+                <a:lnTo>
+                  <a:pt x="47042" y="110783"/>
+                </a:lnTo>
+                <a:lnTo>
+                  <a:pt x="47110" y="110850"/>
+                </a:lnTo>
+                <a:lnTo>
+                  <a:pt x="47585" y="110918"/>
+                </a:lnTo>
+                <a:lnTo>
+                  <a:pt x="48400" y="110986"/>
+                </a:lnTo>
+                <a:lnTo>
+                  <a:pt x="51387" y="111054"/>
+                </a:lnTo>
+                <a:lnTo>
+                  <a:pt x="56071" y="111122"/>
+                </a:lnTo>
+                <a:lnTo>
+                  <a:pt x="87092" y="111122"/>
+                </a:lnTo>
+                <a:lnTo>
+                  <a:pt x="91708" y="111054"/>
+                </a:lnTo>
+                <a:lnTo>
+                  <a:pt x="94695" y="110986"/>
+                </a:lnTo>
+                <a:lnTo>
+                  <a:pt x="95578" y="110918"/>
+                </a:lnTo>
+                <a:lnTo>
+                  <a:pt x="96053" y="110850"/>
+                </a:lnTo>
+                <a:lnTo>
+                  <a:pt x="96121" y="110783"/>
+                </a:lnTo>
+                <a:lnTo>
+                  <a:pt x="96121" y="110579"/>
+                </a:lnTo>
+                <a:lnTo>
+                  <a:pt x="96053" y="110511"/>
+                </a:lnTo>
+                <a:lnTo>
+                  <a:pt x="95713" y="110443"/>
+                </a:lnTo>
+                <a:lnTo>
+                  <a:pt x="95102" y="110307"/>
+                </a:lnTo>
+                <a:lnTo>
+                  <a:pt x="93473" y="110036"/>
+                </a:lnTo>
+                <a:lnTo>
+                  <a:pt x="91369" y="109696"/>
+                </a:lnTo>
+                <a:lnTo>
+                  <a:pt x="90487" y="109493"/>
+                </a:lnTo>
+                <a:lnTo>
+                  <a:pt x="89943" y="109357"/>
+                </a:lnTo>
+                <a:lnTo>
+                  <a:pt x="89740" y="109153"/>
+                </a:lnTo>
+                <a:lnTo>
+                  <a:pt x="89536" y="108746"/>
+                </a:lnTo>
+                <a:lnTo>
+                  <a:pt x="89333" y="108203"/>
+                </a:lnTo>
+                <a:lnTo>
+                  <a:pt x="89197" y="107388"/>
+                </a:lnTo>
+                <a:lnTo>
+                  <a:pt x="88789" y="105284"/>
+                </a:lnTo>
+                <a:lnTo>
+                  <a:pt x="88382" y="102297"/>
+                </a:lnTo>
+                <a:lnTo>
+                  <a:pt x="88043" y="98971"/>
+                </a:lnTo>
+                <a:lnTo>
+                  <a:pt x="87839" y="95713"/>
+                </a:lnTo>
+                <a:close/>
+                <a:moveTo>
+                  <a:pt x="47450" y="111054"/>
+                </a:moveTo>
+                <a:lnTo>
+                  <a:pt x="47450" y="111122"/>
+                </a:lnTo>
+                <a:lnTo>
+                  <a:pt x="47450" y="111393"/>
+                </a:lnTo>
+                <a:lnTo>
+                  <a:pt x="47518" y="111461"/>
+                </a:lnTo>
+                <a:lnTo>
+                  <a:pt x="48807" y="111529"/>
+                </a:lnTo>
+                <a:lnTo>
+                  <a:pt x="52473" y="111597"/>
+                </a:lnTo>
+                <a:lnTo>
+                  <a:pt x="62384" y="111665"/>
+                </a:lnTo>
+                <a:lnTo>
+                  <a:pt x="80779" y="111665"/>
+                </a:lnTo>
+                <a:lnTo>
+                  <a:pt x="90622" y="111597"/>
+                </a:lnTo>
+                <a:lnTo>
+                  <a:pt x="94356" y="111529"/>
+                </a:lnTo>
+                <a:lnTo>
+                  <a:pt x="95646" y="111461"/>
+                </a:lnTo>
+                <a:lnTo>
+                  <a:pt x="95713" y="111393"/>
+                </a:lnTo>
+                <a:lnTo>
+                  <a:pt x="95713" y="111122"/>
+                </a:lnTo>
+                <a:lnTo>
+                  <a:pt x="95646" y="111054"/>
+                </a:lnTo>
+                <a:lnTo>
+                  <a:pt x="94084" y="111122"/>
+                </a:lnTo>
+                <a:lnTo>
+                  <a:pt x="91233" y="111190"/>
+                </a:lnTo>
+                <a:lnTo>
+                  <a:pt x="80847" y="111258"/>
+                </a:lnTo>
+                <a:lnTo>
+                  <a:pt x="62316" y="111258"/>
+                </a:lnTo>
+                <a:lnTo>
+                  <a:pt x="51930" y="111190"/>
+                </a:lnTo>
+                <a:lnTo>
+                  <a:pt x="49079" y="111122"/>
+                </a:lnTo>
+                <a:lnTo>
+                  <a:pt x="47518" y="111054"/>
+                </a:lnTo>
+                <a:close/>
+              </a:path>
+            </a:pathLst>
+          </a:custGeom>
+          <a:solidFill>
+            <a:schemeClr val="dk1"/>
+          </a:solidFill>
+          <a:ln>
+            <a:noFill/>
+          </a:ln>
+        </p:spPr>
+        <p:txBody>
+          <a:bodyPr spcFirstLastPara="1" wrap="square" lIns="91425" tIns="91425" rIns="91425" bIns="91425" anchor="ctr" anchorCtr="0">
+            <a:noAutofit/>
+          </a:bodyPr>
+          <a:lstStyle/>
+          <a:p>
+            <a:pPr marL="0" lvl="0" indent="0" algn="l" rtl="0">
+              <a:spcBef>
+                <a:spcPts val="0"/>
+              </a:spcBef>
+              <a:spcAft>
+                <a:spcPts val="0"/>
+              </a:spcAft>
+              <a:buNone/>
+            </a:pPr>
+            <a:endParaRPr/>
+          </a:p>
+        </p:txBody>
+      </p:sp>
+      <p:pic>
+        <p:nvPicPr>
+          <p:cNvPr id="3" name="Picture 2">
+            <a:extLst>
+              <a:ext uri="{FF2B5EF4-FFF2-40B4-BE49-F238E27FC236}">
+                <a16:creationId xmlns:a16="http://schemas.microsoft.com/office/drawing/2014/main" id="{B38A4022-0A8D-4E2D-BC05-ABB8F01AEF52}"/>
+              </a:ext>
+            </a:extLst>
+          </p:cNvPr>
+          <p:cNvPicPr>
+            <a:picLocks noChangeAspect="1"/>
+          </p:cNvPicPr>
+          <p:nvPr/>
+        </p:nvPicPr>
+        <p:blipFill rotWithShape="1">
+          <a:blip r:embed="rId3"/>
+          <a:srcRect b="1843"/>
+          <a:stretch/>
+        </p:blipFill>
+        <p:spPr>
+          <a:xfrm>
+            <a:off x="1405900" y="720841"/>
+            <a:ext cx="6002741" cy="3263808"/>
+          </a:xfrm>
+          <a:prstGeom prst="rect">
+            <a:avLst/>
+          </a:prstGeom>
+        </p:spPr>
+      </p:pic>
+    </p:spTree>
+    <p:extLst>
+      <p:ext uri="{BB962C8B-B14F-4D97-AF65-F5344CB8AC3E}">
+        <p14:creationId xmlns:p14="http://schemas.microsoft.com/office/powerpoint/2010/main" val="1363302459"/>
+      </p:ext>
+    </p:extLst>
+  </p:cSld>
+  <p:clrMapOvr>
+    <a:masterClrMapping/>
+  </p:clrMapOvr>
+</p:sld>
+</file>
+
+<file path=ppt/slides/slide11.xml><?xml version="1.0" encoding="utf-8"?>
 <p:sld xmlns:a="http://schemas.openxmlformats.org/drawingml/2006/main" xmlns:r="http://schemas.openxmlformats.org/officeDocument/2006/relationships" xmlns:p="http://schemas.openxmlformats.org/presentationml/2006/main">
   <p:cSld>
     <p:spTree>
@@ -6365,7 +6949,7 @@
             </a:pPr>
             <a:fld id="{00000000-1234-1234-1234-123412341234}" type="slidenum">
               <a:rPr lang="en"/>
-              <a:t>10</a:t>
+              <a:t>11</a:t>
             </a:fld>
             <a:endParaRPr/>
           </a:p>
@@ -6485,18 +7069,6 @@
               <a:buNone/>
             </a:pPr>
             <a:r>
-              <a:rPr lang="es-CO" sz="3600" b="1" dirty="0" err="1">
-                <a:solidFill>
-                  <a:srgbClr val="FFC800"/>
-                </a:solidFill>
-                <a:latin typeface="Montserrat"/>
-                <a:ea typeface="Montserrat"/>
-                <a:cs typeface="Montserrat"/>
-                <a:sym typeface="Montserrat"/>
-              </a:rPr>
-              <a:t>Aca</a:t>
-            </a:r>
-            <a:r>
               <a:rPr lang="es-CO" sz="3600" b="1" dirty="0">
                 <a:solidFill>
                   <a:srgbClr val="FFC800"/>
@@ -6506,7 +7078,7 @@
                 <a:cs typeface="Montserrat"/>
                 <a:sym typeface="Montserrat"/>
               </a:rPr>
-              <a:t> toca poner algo</a:t>
+              <a:t>Basado en:</a:t>
             </a:r>
             <a:endParaRPr sz="3600" b="1" dirty="0">
               <a:solidFill>
@@ -6520,20 +7092,181 @@
           </a:p>
         </p:txBody>
       </p:sp>
+      <p:pic>
+        <p:nvPicPr>
+          <p:cNvPr id="1026" name="Picture 2" descr="Resultado de imagen para pinturillo2">
+            <a:extLst>
+              <a:ext uri="{FF2B5EF4-FFF2-40B4-BE49-F238E27FC236}">
+                <a16:creationId xmlns:a16="http://schemas.microsoft.com/office/drawing/2014/main" id="{68D2195E-BFFE-4AF8-8440-E19FCA42F561}"/>
+              </a:ext>
+            </a:extLst>
+          </p:cNvPr>
+          <p:cNvPicPr>
+            <a:picLocks noChangeAspect="1" noChangeArrowheads="1"/>
+          </p:cNvPicPr>
+          <p:nvPr/>
+        </p:nvPicPr>
+        <p:blipFill>
+          <a:blip r:embed="rId3">
+            <a:extLst>
+              <a:ext uri="{28A0092B-C50C-407E-A947-70E740481C1C}">
+                <a14:useLocalDpi xmlns:a14="http://schemas.microsoft.com/office/drawing/2010/main" val="0"/>
+              </a:ext>
+            </a:extLst>
+          </a:blip>
+          <a:srcRect/>
+          <a:stretch>
+            <a:fillRect/>
+          </a:stretch>
+        </p:blipFill>
+        <p:spPr bwMode="auto">
+          <a:xfrm>
+            <a:off x="3946524" y="1860998"/>
+            <a:ext cx="4815603" cy="3009752"/>
+          </a:xfrm>
+          <a:prstGeom prst="rect">
+            <a:avLst/>
+          </a:prstGeom>
+          <a:noFill/>
+          <a:extLst>
+            <a:ext uri="{909E8E84-426E-40DD-AFC4-6F175D3DCCD1}">
+              <a14:hiddenFill xmlns:a14="http://schemas.microsoft.com/office/drawing/2010/main">
+                <a:solidFill>
+                  <a:srgbClr val="FFFFFF"/>
+                </a:solidFill>
+              </a14:hiddenFill>
+            </a:ext>
+          </a:extLst>
+        </p:spPr>
+      </p:pic>
+      <p:pic>
+        <p:nvPicPr>
+          <p:cNvPr id="1028" name="Picture 4" descr="Resultado de imagen para pinturillo2">
+            <a:extLst>
+              <a:ext uri="{FF2B5EF4-FFF2-40B4-BE49-F238E27FC236}">
+                <a16:creationId xmlns:a16="http://schemas.microsoft.com/office/drawing/2014/main" id="{232B3A0E-3FF8-4B3A-A233-F51D554A89C2}"/>
+              </a:ext>
+            </a:extLst>
+          </p:cNvPr>
+          <p:cNvPicPr>
+            <a:picLocks noChangeAspect="1" noChangeArrowheads="1"/>
+          </p:cNvPicPr>
+          <p:nvPr/>
+        </p:nvPicPr>
+        <p:blipFill>
+          <a:blip r:embed="rId4">
+            <a:extLst>
+              <a:ext uri="{28A0092B-C50C-407E-A947-70E740481C1C}">
+                <a14:useLocalDpi xmlns:a14="http://schemas.microsoft.com/office/drawing/2010/main" val="0"/>
+              </a:ext>
+            </a:extLst>
+          </a:blip>
+          <a:srcRect/>
+          <a:stretch>
+            <a:fillRect/>
+          </a:stretch>
+        </p:blipFill>
+        <p:spPr bwMode="auto">
+          <a:xfrm>
+            <a:off x="992408" y="2591888"/>
+            <a:ext cx="2106624" cy="2106624"/>
+          </a:xfrm>
+          <a:prstGeom prst="rect">
+            <a:avLst/>
+          </a:prstGeom>
+          <a:noFill/>
+          <a:extLst>
+            <a:ext uri="{909E8E84-426E-40DD-AFC4-6F175D3DCCD1}">
+              <a14:hiddenFill xmlns:a14="http://schemas.microsoft.com/office/drawing/2010/main">
+                <a:solidFill>
+                  <a:srgbClr val="FFFFFF"/>
+                </a:solidFill>
+              </a14:hiddenFill>
+            </a:ext>
+          </a:extLst>
+        </p:spPr>
+      </p:pic>
+    </p:spTree>
+  </p:cSld>
+  <p:clrMapOvr>
+    <a:masterClrMapping/>
+  </p:clrMapOvr>
+</p:sld>
+</file>
+
+<file path=ppt/slides/slide3.xml><?xml version="1.0" encoding="utf-8"?>
+<p:sld xmlns:a="http://schemas.openxmlformats.org/drawingml/2006/main" xmlns:r="http://schemas.openxmlformats.org/officeDocument/2006/relationships" xmlns:p="http://schemas.openxmlformats.org/presentationml/2006/main">
+  <p:cSld>
+    <p:spTree>
+      <p:nvGrpSpPr>
+        <p:cNvPr id="1" name="Shape 129"/>
+        <p:cNvGrpSpPr/>
+        <p:nvPr/>
+      </p:nvGrpSpPr>
+      <p:grpSpPr>
+        <a:xfrm>
+          <a:off x="0" y="0"/>
+          <a:ext cx="0" cy="0"/>
+          <a:chOff x="0" y="0"/>
+          <a:chExt cx="0" cy="0"/>
+        </a:xfrm>
+      </p:grpSpPr>
       <p:sp>
         <p:nvSpPr>
-          <p:cNvPr id="110" name="Google Shape;110;p21"/>
+          <p:cNvPr id="130" name="Google Shape;130;p24"/>
           <p:cNvSpPr txBox="1">
             <a:spLocks noGrp="1"/>
           </p:cNvSpPr>
           <p:nvPr>
-            <p:ph type="body" idx="4294967295"/>
+            <p:ph type="title"/>
           </p:nvPr>
         </p:nvSpPr>
         <p:spPr>
           <a:xfrm>
-            <a:off x="431616" y="2919450"/>
-            <a:ext cx="6001800" cy="2362800"/>
+            <a:off x="457200" y="447620"/>
+            <a:ext cx="8229600" cy="1071900"/>
+          </a:xfrm>
+          <a:prstGeom prst="rect">
+            <a:avLst/>
+          </a:prstGeom>
+        </p:spPr>
+        <p:txBody>
+          <a:bodyPr spcFirstLastPara="1" wrap="square" lIns="91425" tIns="91425" rIns="91425" bIns="91425" anchor="b" anchorCtr="0">
+            <a:noAutofit/>
+          </a:bodyPr>
+          <a:lstStyle/>
+          <a:p>
+            <a:pPr marL="0" lvl="0" indent="0" algn="l" rtl="0">
+              <a:spcBef>
+                <a:spcPts val="0"/>
+              </a:spcBef>
+              <a:spcAft>
+                <a:spcPts val="0"/>
+              </a:spcAft>
+              <a:buNone/>
+            </a:pPr>
+            <a:r>
+              <a:rPr lang="es-CO" dirty="0"/>
+              <a:t>Novedades…</a:t>
+            </a:r>
+            <a:endParaRPr dirty="0"/>
+          </a:p>
+        </p:txBody>
+      </p:sp>
+      <p:sp>
+        <p:nvSpPr>
+          <p:cNvPr id="131" name="Google Shape;131;p24"/>
+          <p:cNvSpPr txBox="1">
+            <a:spLocks noGrp="1"/>
+          </p:cNvSpPr>
+          <p:nvPr>
+            <p:ph type="body" idx="1"/>
+          </p:nvPr>
+        </p:nvSpPr>
+        <p:spPr>
+          <a:xfrm>
+            <a:off x="457200" y="2216381"/>
+            <a:ext cx="8020200" cy="2815200"/>
           </a:xfrm>
           <a:prstGeom prst="rect">
             <a:avLst/>
@@ -6545,30 +7278,152 @@
           </a:bodyPr>
           <a:lstStyle/>
           <a:p>
-            <a:pPr marL="0" lvl="0" indent="0" algn="l" rtl="0">
+            <a:pPr marL="457200" lvl="0" indent="-355600" algn="l" rtl="0">
               <a:spcBef>
                 <a:spcPts val="600"/>
               </a:spcBef>
               <a:spcAft>
                 <a:spcPts val="0"/>
               </a:spcAft>
-              <a:buNone/>
+              <a:buSzPts val="2000"/>
+              <a:buChar char="○"/>
             </a:pPr>
             <a:r>
-              <a:rPr lang="es-MX" dirty="0" err="1"/>
-              <a:t>Aca</a:t>
+              <a:rPr lang="en-US" dirty="0" err="1"/>
+              <a:t>En</a:t>
             </a:r>
             <a:r>
-              <a:rPr lang="es-MX" dirty="0"/>
-              <a:t> igual</a:t>
+              <a:rPr lang="en-US" dirty="0"/>
+              <a:t> </a:t>
             </a:r>
+            <a:r>
+              <a:rPr lang="en-US" dirty="0" err="1"/>
+              <a:t>equipos</a:t>
+            </a:r>
+            <a:r>
+              <a:rPr lang="en-US" dirty="0"/>
+              <a:t>.</a:t>
+            </a:r>
+            <a:endParaRPr dirty="0"/>
+          </a:p>
+          <a:p>
+            <a:pPr marL="457200" lvl="0" indent="-355600" algn="l" rtl="0">
+              <a:spcBef>
+                <a:spcPts val="0"/>
+              </a:spcBef>
+              <a:spcAft>
+                <a:spcPts val="0"/>
+              </a:spcAft>
+              <a:buSzPts val="2000"/>
+              <a:buChar char="○"/>
+            </a:pPr>
+            <a:r>
+              <a:rPr lang="en-US" dirty="0"/>
+              <a:t>Una </a:t>
+            </a:r>
+            <a:r>
+              <a:rPr lang="en-US" dirty="0" err="1"/>
+              <a:t>partida</a:t>
+            </a:r>
+            <a:r>
+              <a:rPr lang="en-US" dirty="0"/>
+              <a:t> </a:t>
+            </a:r>
+            <a:r>
+              <a:rPr lang="en-US" dirty="0" err="1"/>
+              <a:t>tiene</a:t>
+            </a:r>
+            <a:r>
+              <a:rPr lang="en-US" dirty="0"/>
+              <a:t> 5 </a:t>
+            </a:r>
+            <a:r>
+              <a:rPr lang="en-US" dirty="0" err="1"/>
+              <a:t>rondas</a:t>
+            </a:r>
+            <a:r>
+              <a:rPr lang="en-US" dirty="0"/>
+              <a:t>. Victoria con 3 de 5 </a:t>
+            </a:r>
+            <a:r>
+              <a:rPr lang="en-US" dirty="0" err="1"/>
+              <a:t>rondas</a:t>
+            </a:r>
+            <a:r>
+              <a:rPr lang="en-US" dirty="0"/>
+              <a:t>.</a:t>
+            </a:r>
+            <a:endParaRPr dirty="0"/>
+          </a:p>
+          <a:p>
+            <a:pPr marL="457200" lvl="0" indent="-355600" algn="l" rtl="0">
+              <a:spcBef>
+                <a:spcPts val="0"/>
+              </a:spcBef>
+              <a:spcAft>
+                <a:spcPts val="0"/>
+              </a:spcAft>
+              <a:buSzPts val="2000"/>
+              <a:buChar char="○"/>
+            </a:pPr>
+            <a:r>
+              <a:rPr lang="en-US" dirty="0"/>
+              <a:t>2 </a:t>
+            </a:r>
+            <a:r>
+              <a:rPr lang="en-US" dirty="0" err="1"/>
+              <a:t>pintores</a:t>
+            </a:r>
+            <a:r>
+              <a:rPr lang="en-US" dirty="0"/>
+              <a:t> al </a:t>
+            </a:r>
+            <a:r>
+              <a:rPr lang="en-US" dirty="0" err="1"/>
+              <a:t>mismo</a:t>
+            </a:r>
+            <a:r>
+              <a:rPr lang="en-US" dirty="0"/>
+              <a:t> </a:t>
+            </a:r>
+            <a:r>
+              <a:rPr lang="en-US" dirty="0" err="1"/>
+              <a:t>tiempo</a:t>
+            </a:r>
+            <a:r>
+              <a:rPr lang="en-US" dirty="0"/>
+              <a:t>!</a:t>
+            </a:r>
+          </a:p>
+          <a:p>
+            <a:pPr lvl="0">
+              <a:spcBef>
+                <a:spcPts val="0"/>
+              </a:spcBef>
+            </a:pPr>
+            <a:r>
+              <a:rPr lang="es-ES" dirty="0"/>
+              <a:t>Se hace rotación de pintores por cada palabra adivinada en cada equipo.</a:t>
+            </a:r>
+            <a:endParaRPr dirty="0"/>
+          </a:p>
+          <a:p>
+            <a:pPr marL="0" lvl="0" indent="0" algn="l" rtl="0">
+              <a:spcBef>
+                <a:spcPts val="600"/>
+              </a:spcBef>
+              <a:spcAft>
+                <a:spcPts val="0"/>
+              </a:spcAft>
+              <a:buNone/>
+            </a:pPr>
             <a:endParaRPr dirty="0"/>
           </a:p>
         </p:txBody>
       </p:sp>
       <p:sp>
         <p:nvSpPr>
-          <p:cNvPr id="112" name="Google Shape;112;p21"/>
+          <p:cNvPr id="132" name="Google Shape;132;p24"/>
           <p:cNvSpPr txBox="1">
             <a:spLocks noGrp="1"/>
           </p:cNvSpPr>
@@ -6602,13 +7457,48 @@
             </a:pPr>
             <a:fld id="{00000000-1234-1234-1234-123412341234}" type="slidenum">
               <a:rPr lang="en"/>
-              <a:t>2</a:t>
+              <a:t>3</a:t>
             </a:fld>
             <a:endParaRPr/>
           </a:p>
         </p:txBody>
       </p:sp>
+      <p:pic>
+        <p:nvPicPr>
+          <p:cNvPr id="5" name="Picture 4">
+            <a:extLst>
+              <a:ext uri="{FF2B5EF4-FFF2-40B4-BE49-F238E27FC236}">
+                <a16:creationId xmlns:a16="http://schemas.microsoft.com/office/drawing/2014/main" id="{A0942E9D-F6CC-4F55-ABA1-9A0EDBD33678}"/>
+              </a:ext>
+            </a:extLst>
+          </p:cNvPr>
+          <p:cNvPicPr>
+            <a:picLocks noChangeAspect="1"/>
+          </p:cNvPicPr>
+          <p:nvPr/>
+        </p:nvPicPr>
+        <p:blipFill>
+          <a:blip r:embed="rId3"/>
+          <a:stretch>
+            <a:fillRect/>
+          </a:stretch>
+        </p:blipFill>
+        <p:spPr>
+          <a:xfrm>
+            <a:off x="3787880" y="732415"/>
+            <a:ext cx="5176733" cy="1187999"/>
+          </a:xfrm>
+          <a:prstGeom prst="rect">
+            <a:avLst/>
+          </a:prstGeom>
+        </p:spPr>
+      </p:pic>
     </p:spTree>
+    <p:extLst>
+      <p:ext uri="{BB962C8B-B14F-4D97-AF65-F5344CB8AC3E}">
+        <p14:creationId xmlns:p14="http://schemas.microsoft.com/office/powerpoint/2010/main" val="3591387838"/>
+      </p:ext>
+    </p:extLst>
   </p:cSld>
   <p:clrMapOvr>
     <a:masterClrMapping/>
@@ -6616,7 +7506,7 @@
 </p:sld>
 </file>
 
-<file path=ppt/slides/slide3.xml><?xml version="1.0" encoding="utf-8"?>
+<file path=ppt/slides/slide4.xml><?xml version="1.0" encoding="utf-8"?>
 <p:sld xmlns:a="http://schemas.openxmlformats.org/drawingml/2006/main" xmlns:r="http://schemas.openxmlformats.org/officeDocument/2006/relationships" xmlns:p="http://schemas.openxmlformats.org/presentationml/2006/main">
   <p:cSld>
     <p:spTree>
@@ -6711,7 +7601,7 @@
             </a:pPr>
             <a:fld id="{00000000-1234-1234-1234-123412341234}" type="slidenum">
               <a:rPr lang="en"/>
-              <a:t>3</a:t>
+              <a:t>4</a:t>
             </a:fld>
             <a:endParaRPr/>
           </a:p>
@@ -6719,10 +7609,10 @@
       </p:sp>
       <p:pic>
         <p:nvPicPr>
-          <p:cNvPr id="5" name="Imagen 4">
+          <p:cNvPr id="3" name="Picture 2">
             <a:extLst>
               <a:ext uri="{FF2B5EF4-FFF2-40B4-BE49-F238E27FC236}">
-                <a16:creationId xmlns:a16="http://schemas.microsoft.com/office/drawing/2014/main" id="{C37EFB01-23B6-4897-9FD1-9C5BA8AC23AC}"/>
+                <a16:creationId xmlns:a16="http://schemas.microsoft.com/office/drawing/2014/main" id="{68ADAB29-51A6-4417-82BB-85C5E296DE0C}"/>
               </a:ext>
             </a:extLst>
           </p:cNvPr>
@@ -6739,8 +7629,8 @@
         </p:blipFill>
         <p:spPr>
           <a:xfrm>
-            <a:off x="1472155" y="846123"/>
-            <a:ext cx="6055696" cy="4124262"/>
+            <a:off x="2072526" y="1127982"/>
+            <a:ext cx="5278792" cy="3410193"/>
           </a:xfrm>
           <a:prstGeom prst="rect">
             <a:avLst/>
@@ -6755,7 +7645,7 @@
 </p:sld>
 </file>
 
-<file path=ppt/slides/slide4.xml><?xml version="1.0" encoding="utf-8"?>
+<file path=ppt/slides/slide5.xml><?xml version="1.0" encoding="utf-8"?>
 <p:sld xmlns:a="http://schemas.openxmlformats.org/drawingml/2006/main" xmlns:r="http://schemas.openxmlformats.org/officeDocument/2006/relationships" xmlns:p="http://schemas.openxmlformats.org/presentationml/2006/main">
   <p:cSld>
     <p:spTree>
@@ -6842,12 +7732,42 @@
             </a:pPr>
             <a:fld id="{00000000-1234-1234-1234-123412341234}" type="slidenum">
               <a:rPr lang="en"/>
-              <a:t>4</a:t>
+              <a:t>5</a:t>
             </a:fld>
             <a:endParaRPr/>
           </a:p>
         </p:txBody>
       </p:sp>
+      <p:pic>
+        <p:nvPicPr>
+          <p:cNvPr id="2" name="Picture 1">
+            <a:extLst>
+              <a:ext uri="{FF2B5EF4-FFF2-40B4-BE49-F238E27FC236}">
+                <a16:creationId xmlns:a16="http://schemas.microsoft.com/office/drawing/2014/main" id="{FAD87C65-C0A2-4E0D-B868-EE0CF0E73BEF}"/>
+              </a:ext>
+            </a:extLst>
+          </p:cNvPr>
+          <p:cNvPicPr>
+            <a:picLocks noChangeAspect="1"/>
+          </p:cNvPicPr>
+          <p:nvPr/>
+        </p:nvPicPr>
+        <p:blipFill>
+          <a:blip r:embed="rId3"/>
+          <a:stretch>
+            <a:fillRect/>
+          </a:stretch>
+        </p:blipFill>
+        <p:spPr>
+          <a:xfrm>
+            <a:off x="2234853" y="956081"/>
+            <a:ext cx="4674293" cy="3821269"/>
+          </a:xfrm>
+          <a:prstGeom prst="rect">
+            <a:avLst/>
+          </a:prstGeom>
+        </p:spPr>
+      </p:pic>
     </p:spTree>
     <p:extLst>
       <p:ext uri="{BB962C8B-B14F-4D97-AF65-F5344CB8AC3E}">
@@ -6861,7 +7781,7 @@
 </p:sld>
 </file>
 
-<file path=ppt/slides/slide5.xml><?xml version="1.0" encoding="utf-8"?>
+<file path=ppt/slides/slide6.xml><?xml version="1.0" encoding="utf-8"?>
 <p:sld xmlns:a="http://schemas.openxmlformats.org/drawingml/2006/main" xmlns:r="http://schemas.openxmlformats.org/officeDocument/2006/relationships" xmlns:p="http://schemas.openxmlformats.org/presentationml/2006/main">
   <p:cSld>
     <p:spTree>
@@ -6956,235 +7876,46 @@
             </a:pPr>
             <a:fld id="{00000000-1234-1234-1234-123412341234}" type="slidenum">
               <a:rPr lang="en"/>
-              <a:t>5</a:t>
-            </a:fld>
-            <a:endParaRPr/>
-          </a:p>
-        </p:txBody>
-      </p:sp>
-    </p:spTree>
-    <p:extLst>
-      <p:ext uri="{BB962C8B-B14F-4D97-AF65-F5344CB8AC3E}">
-        <p14:creationId xmlns:p14="http://schemas.microsoft.com/office/powerpoint/2010/main" val="1744691697"/>
-      </p:ext>
-    </p:extLst>
-  </p:cSld>
-  <p:clrMapOvr>
-    <a:masterClrMapping/>
-  </p:clrMapOvr>
-</p:sld>
-</file>
-
-<file path=ppt/slides/slide6.xml><?xml version="1.0" encoding="utf-8"?>
-<p:sld xmlns:a="http://schemas.openxmlformats.org/drawingml/2006/main" xmlns:r="http://schemas.openxmlformats.org/officeDocument/2006/relationships" xmlns:p="http://schemas.openxmlformats.org/presentationml/2006/main">
-  <p:cSld>
-    <p:spTree>
-      <p:nvGrpSpPr>
-        <p:cNvPr id="1" name="Shape 129"/>
-        <p:cNvGrpSpPr/>
-        <p:nvPr/>
-      </p:nvGrpSpPr>
-      <p:grpSpPr>
-        <a:xfrm>
-          <a:off x="0" y="0"/>
-          <a:ext cx="0" cy="0"/>
-          <a:chOff x="0" y="0"/>
-          <a:chExt cx="0" cy="0"/>
-        </a:xfrm>
-      </p:grpSpPr>
-      <p:sp>
-        <p:nvSpPr>
-          <p:cNvPr id="130" name="Google Shape;130;p24"/>
-          <p:cNvSpPr txBox="1">
-            <a:spLocks noGrp="1"/>
-          </p:cNvSpPr>
-          <p:nvPr>
-            <p:ph type="title"/>
-          </p:nvPr>
-        </p:nvSpPr>
-        <p:spPr>
-          <a:xfrm>
-            <a:off x="457200" y="447620"/>
-            <a:ext cx="8229600" cy="1071900"/>
-          </a:xfrm>
-          <a:prstGeom prst="rect">
-            <a:avLst/>
-          </a:prstGeom>
-        </p:spPr>
-        <p:txBody>
-          <a:bodyPr spcFirstLastPara="1" wrap="square" lIns="91425" tIns="91425" rIns="91425" bIns="91425" anchor="b" anchorCtr="0">
-            <a:noAutofit/>
-          </a:bodyPr>
-          <a:lstStyle/>
-          <a:p>
-            <a:pPr marL="0" lvl="0" indent="0" algn="l" rtl="0">
-              <a:spcBef>
-                <a:spcPts val="0"/>
-              </a:spcBef>
-              <a:spcAft>
-                <a:spcPts val="0"/>
-              </a:spcAft>
-              <a:buNone/>
-            </a:pPr>
-            <a:r>
-              <a:rPr lang="es-CO" dirty="0"/>
-              <a:t>Diagrama de clases</a:t>
-            </a:r>
-            <a:endParaRPr dirty="0"/>
-          </a:p>
-        </p:txBody>
-      </p:sp>
-      <p:sp>
-        <p:nvSpPr>
-          <p:cNvPr id="131" name="Google Shape;131;p24"/>
-          <p:cNvSpPr txBox="1">
-            <a:spLocks noGrp="1"/>
-          </p:cNvSpPr>
-          <p:nvPr>
-            <p:ph type="body" idx="1"/>
-          </p:nvPr>
-        </p:nvSpPr>
-        <p:spPr>
-          <a:xfrm>
-            <a:off x="561950" y="1880794"/>
-            <a:ext cx="8020200" cy="2815200"/>
-          </a:xfrm>
-          <a:prstGeom prst="rect">
-            <a:avLst/>
-          </a:prstGeom>
-        </p:spPr>
-        <p:txBody>
-          <a:bodyPr spcFirstLastPara="1" wrap="square" lIns="91425" tIns="91425" rIns="91425" bIns="91425" anchor="t" anchorCtr="0">
-            <a:noAutofit/>
-          </a:bodyPr>
-          <a:lstStyle/>
-          <a:p>
-            <a:pPr marL="457200" lvl="0" indent="-355600" algn="l" rtl="0">
-              <a:spcBef>
-                <a:spcPts val="600"/>
-              </a:spcBef>
-              <a:spcAft>
-                <a:spcPts val="0"/>
-              </a:spcAft>
-              <a:buSzPts val="2000"/>
-              <a:buChar char="○"/>
-            </a:pPr>
-            <a:r>
-              <a:rPr lang="en" dirty="0"/>
-              <a:t>Here you have a list of items</a:t>
-            </a:r>
-            <a:endParaRPr dirty="0"/>
-          </a:p>
-          <a:p>
-            <a:pPr marL="457200" lvl="0" indent="-355600" algn="l" rtl="0">
-              <a:spcBef>
-                <a:spcPts val="0"/>
-              </a:spcBef>
-              <a:spcAft>
-                <a:spcPts val="0"/>
-              </a:spcAft>
-              <a:buSzPts val="2000"/>
-              <a:buChar char="○"/>
-            </a:pPr>
-            <a:r>
-              <a:rPr lang="en" dirty="0"/>
-              <a:t>And some text</a:t>
-            </a:r>
-            <a:endParaRPr dirty="0"/>
-          </a:p>
-          <a:p>
-            <a:pPr marL="457200" lvl="0" indent="-355600" algn="l" rtl="0">
-              <a:spcBef>
-                <a:spcPts val="0"/>
-              </a:spcBef>
-              <a:spcAft>
-                <a:spcPts val="0"/>
-              </a:spcAft>
-              <a:buSzPts val="2000"/>
-              <a:buChar char="○"/>
-            </a:pPr>
-            <a:r>
-              <a:rPr lang="en" dirty="0"/>
-              <a:t>But remember not to overload your slides with content</a:t>
-            </a:r>
-            <a:endParaRPr dirty="0"/>
-          </a:p>
-          <a:p>
-            <a:pPr marL="0" lvl="0" indent="0" algn="l" rtl="0">
-              <a:spcBef>
-                <a:spcPts val="600"/>
-              </a:spcBef>
-              <a:spcAft>
-                <a:spcPts val="0"/>
-              </a:spcAft>
-              <a:buNone/>
-            </a:pPr>
-            <a:endParaRPr dirty="0"/>
-          </a:p>
-          <a:p>
-            <a:pPr marL="0" lvl="0" indent="0" algn="l" rtl="0">
-              <a:spcBef>
-                <a:spcPts val="600"/>
-              </a:spcBef>
-              <a:spcAft>
-                <a:spcPts val="0"/>
-              </a:spcAft>
-              <a:buNone/>
-            </a:pPr>
-            <a:r>
-              <a:rPr lang="en" dirty="0"/>
-              <a:t>Your audience will listen to you or read the content, but won’t do both. </a:t>
-            </a:r>
-            <a:endParaRPr dirty="0"/>
-          </a:p>
-        </p:txBody>
-      </p:sp>
-      <p:sp>
-        <p:nvSpPr>
-          <p:cNvPr id="132" name="Google Shape;132;p24"/>
-          <p:cNvSpPr txBox="1">
-            <a:spLocks noGrp="1"/>
-          </p:cNvSpPr>
-          <p:nvPr>
-            <p:ph type="sldNum" idx="12"/>
-          </p:nvPr>
-        </p:nvSpPr>
-        <p:spPr>
-          <a:xfrm>
-            <a:off x="8556775" y="4777350"/>
-            <a:ext cx="548700" cy="290100"/>
-          </a:xfrm>
-          <a:prstGeom prst="rect">
-            <a:avLst/>
-          </a:prstGeom>
-        </p:spPr>
-        <p:txBody>
-          <a:bodyPr spcFirstLastPara="1" wrap="square" lIns="91425" tIns="91425" rIns="91425" bIns="91425" anchor="t" anchorCtr="0">
-            <a:noAutofit/>
-          </a:bodyPr>
-          <a:lstStyle/>
-          <a:p>
-            <a:pPr marL="0" lvl="0" indent="0" algn="r" rtl="0">
-              <a:spcBef>
-                <a:spcPts val="0"/>
-              </a:spcBef>
-              <a:spcAft>
-                <a:spcPts val="0"/>
-              </a:spcAft>
-              <a:buNone/>
-            </a:pPr>
-            <a:fld id="{00000000-1234-1234-1234-123412341234}" type="slidenum">
-              <a:rPr lang="en"/>
               <a:t>6</a:t>
             </a:fld>
             <a:endParaRPr/>
           </a:p>
         </p:txBody>
       </p:sp>
+      <p:pic>
+        <p:nvPicPr>
+          <p:cNvPr id="2" name="Picture 1">
+            <a:extLst>
+              <a:ext uri="{FF2B5EF4-FFF2-40B4-BE49-F238E27FC236}">
+                <a16:creationId xmlns:a16="http://schemas.microsoft.com/office/drawing/2014/main" id="{CB03237E-5EAD-4896-98E2-09F254682C2E}"/>
+              </a:ext>
+            </a:extLst>
+          </p:cNvPr>
+          <p:cNvPicPr>
+            <a:picLocks noChangeAspect="1"/>
+          </p:cNvPicPr>
+          <p:nvPr/>
+        </p:nvPicPr>
+        <p:blipFill>
+          <a:blip r:embed="rId3"/>
+          <a:stretch>
+            <a:fillRect/>
+          </a:stretch>
+        </p:blipFill>
+        <p:spPr>
+          <a:xfrm>
+            <a:off x="2960057" y="1082206"/>
+            <a:ext cx="2817622" cy="3695144"/>
+          </a:xfrm>
+          <a:prstGeom prst="rect">
+            <a:avLst/>
+          </a:prstGeom>
+        </p:spPr>
+      </p:pic>
     </p:spTree>
     <p:extLst>
       <p:ext uri="{BB962C8B-B14F-4D97-AF65-F5344CB8AC3E}">
-        <p14:creationId xmlns:p14="http://schemas.microsoft.com/office/powerpoint/2010/main" val="3591387838"/>
+        <p14:creationId xmlns:p14="http://schemas.microsoft.com/office/powerpoint/2010/main" val="1744691697"/>
       </p:ext>
     </p:extLst>
   </p:cSld>
@@ -7199,7 +7930,7 @@
   <p:cSld>
     <p:spTree>
       <p:nvGrpSpPr>
-        <p:cNvPr id="1" name="Shape 129"/>
+        <p:cNvPr id="1" name="Shape 285"/>
         <p:cNvGrpSpPr/>
         <p:nvPr/>
       </p:nvGrpSpPr>
@@ -7213,199 +7944,478 @@
       </p:grpSpPr>
       <p:sp>
         <p:nvSpPr>
-          <p:cNvPr id="130" name="Google Shape;130;p24"/>
-          <p:cNvSpPr txBox="1">
-            <a:spLocks noGrp="1"/>
-          </p:cNvSpPr>
-          <p:nvPr>
-            <p:ph type="title"/>
-          </p:nvPr>
+          <p:cNvPr id="63" name="Google Shape;331;p35">
+            <a:extLst>
+              <a:ext uri="{FF2B5EF4-FFF2-40B4-BE49-F238E27FC236}">
+                <a16:creationId xmlns:a16="http://schemas.microsoft.com/office/drawing/2014/main" id="{9E78A624-48D3-4C9D-85E3-FD4EEFB9017F}"/>
+              </a:ext>
+            </a:extLst>
+          </p:cNvPr>
+          <p:cNvSpPr/>
+          <p:nvPr/>
         </p:nvSpPr>
         <p:spPr>
           <a:xfrm>
-            <a:off x="457200" y="447620"/>
-            <a:ext cx="8229600" cy="1071900"/>
+            <a:off x="1254797" y="488137"/>
+            <a:ext cx="6400087" cy="4364739"/>
+          </a:xfrm>
+          <a:custGeom>
+            <a:avLst/>
+            <a:gdLst/>
+            <a:ahLst/>
+            <a:cxnLst/>
+            <a:rect l="l" t="t" r="r" b="b"/>
+            <a:pathLst>
+              <a:path w="143434" h="111665" extrusionOk="0">
+                <a:moveTo>
+                  <a:pt x="71751" y="2308"/>
+                </a:moveTo>
+                <a:lnTo>
+                  <a:pt x="71887" y="2376"/>
+                </a:lnTo>
+                <a:lnTo>
+                  <a:pt x="72091" y="2444"/>
+                </a:lnTo>
+                <a:lnTo>
+                  <a:pt x="72159" y="2647"/>
+                </a:lnTo>
+                <a:lnTo>
+                  <a:pt x="72226" y="2783"/>
+                </a:lnTo>
+                <a:lnTo>
+                  <a:pt x="72159" y="2987"/>
+                </a:lnTo>
+                <a:lnTo>
+                  <a:pt x="72091" y="3190"/>
+                </a:lnTo>
+                <a:lnTo>
+                  <a:pt x="71887" y="3258"/>
+                </a:lnTo>
+                <a:lnTo>
+                  <a:pt x="71751" y="3326"/>
+                </a:lnTo>
+                <a:lnTo>
+                  <a:pt x="71548" y="3258"/>
+                </a:lnTo>
+                <a:lnTo>
+                  <a:pt x="71344" y="3190"/>
+                </a:lnTo>
+                <a:lnTo>
+                  <a:pt x="71276" y="2987"/>
+                </a:lnTo>
+                <a:lnTo>
+                  <a:pt x="71208" y="2783"/>
+                </a:lnTo>
+                <a:lnTo>
+                  <a:pt x="71276" y="2647"/>
+                </a:lnTo>
+                <a:lnTo>
+                  <a:pt x="71344" y="2444"/>
+                </a:lnTo>
+                <a:lnTo>
+                  <a:pt x="71548" y="2376"/>
+                </a:lnTo>
+                <a:lnTo>
+                  <a:pt x="71751" y="2308"/>
+                </a:lnTo>
+                <a:close/>
+                <a:moveTo>
+                  <a:pt x="137528" y="5906"/>
+                </a:moveTo>
+                <a:lnTo>
+                  <a:pt x="137596" y="5974"/>
+                </a:lnTo>
+                <a:lnTo>
+                  <a:pt x="137596" y="89604"/>
+                </a:lnTo>
+                <a:lnTo>
+                  <a:pt x="5906" y="89604"/>
+                </a:lnTo>
+                <a:lnTo>
+                  <a:pt x="5906" y="5974"/>
+                </a:lnTo>
+                <a:lnTo>
+                  <a:pt x="5906" y="5906"/>
+                </a:lnTo>
+                <a:close/>
+                <a:moveTo>
+                  <a:pt x="3530" y="0"/>
+                </a:moveTo>
+                <a:lnTo>
+                  <a:pt x="3191" y="68"/>
+                </a:lnTo>
+                <a:lnTo>
+                  <a:pt x="2444" y="339"/>
+                </a:lnTo>
+                <a:lnTo>
+                  <a:pt x="1766" y="679"/>
+                </a:lnTo>
+                <a:lnTo>
+                  <a:pt x="1155" y="1154"/>
+                </a:lnTo>
+                <a:lnTo>
+                  <a:pt x="679" y="1765"/>
+                </a:lnTo>
+                <a:lnTo>
+                  <a:pt x="272" y="2444"/>
+                </a:lnTo>
+                <a:lnTo>
+                  <a:pt x="69" y="3190"/>
+                </a:lnTo>
+                <a:lnTo>
+                  <a:pt x="1" y="3598"/>
+                </a:lnTo>
+                <a:lnTo>
+                  <a:pt x="1" y="4005"/>
+                </a:lnTo>
+                <a:lnTo>
+                  <a:pt x="1" y="91572"/>
+                </a:lnTo>
+                <a:lnTo>
+                  <a:pt x="1" y="91979"/>
+                </a:lnTo>
+                <a:lnTo>
+                  <a:pt x="69" y="92319"/>
+                </a:lnTo>
+                <a:lnTo>
+                  <a:pt x="272" y="93065"/>
+                </a:lnTo>
+                <a:lnTo>
+                  <a:pt x="679" y="93744"/>
+                </a:lnTo>
+                <a:lnTo>
+                  <a:pt x="1155" y="94355"/>
+                </a:lnTo>
+                <a:lnTo>
+                  <a:pt x="1766" y="94830"/>
+                </a:lnTo>
+                <a:lnTo>
+                  <a:pt x="2444" y="95238"/>
+                </a:lnTo>
+                <a:lnTo>
+                  <a:pt x="3191" y="95441"/>
+                </a:lnTo>
+                <a:lnTo>
+                  <a:pt x="3530" y="95509"/>
+                </a:lnTo>
+                <a:lnTo>
+                  <a:pt x="139904" y="95509"/>
+                </a:lnTo>
+                <a:lnTo>
+                  <a:pt x="140311" y="95441"/>
+                </a:lnTo>
+                <a:lnTo>
+                  <a:pt x="141058" y="95238"/>
+                </a:lnTo>
+                <a:lnTo>
+                  <a:pt x="141737" y="94830"/>
+                </a:lnTo>
+                <a:lnTo>
+                  <a:pt x="142280" y="94355"/>
+                </a:lnTo>
+                <a:lnTo>
+                  <a:pt x="142755" y="93744"/>
+                </a:lnTo>
+                <a:lnTo>
+                  <a:pt x="143162" y="93065"/>
+                </a:lnTo>
+                <a:lnTo>
+                  <a:pt x="143366" y="92319"/>
+                </a:lnTo>
+                <a:lnTo>
+                  <a:pt x="143434" y="91979"/>
+                </a:lnTo>
+                <a:lnTo>
+                  <a:pt x="143434" y="91572"/>
+                </a:lnTo>
+                <a:lnTo>
+                  <a:pt x="143434" y="4005"/>
+                </a:lnTo>
+                <a:lnTo>
+                  <a:pt x="143434" y="3598"/>
+                </a:lnTo>
+                <a:lnTo>
+                  <a:pt x="143366" y="3190"/>
+                </a:lnTo>
+                <a:lnTo>
+                  <a:pt x="143162" y="2444"/>
+                </a:lnTo>
+                <a:lnTo>
+                  <a:pt x="142755" y="1765"/>
+                </a:lnTo>
+                <a:lnTo>
+                  <a:pt x="142280" y="1154"/>
+                </a:lnTo>
+                <a:lnTo>
+                  <a:pt x="141737" y="679"/>
+                </a:lnTo>
+                <a:lnTo>
+                  <a:pt x="141058" y="339"/>
+                </a:lnTo>
+                <a:lnTo>
+                  <a:pt x="140311" y="68"/>
+                </a:lnTo>
+                <a:lnTo>
+                  <a:pt x="139904" y="0"/>
+                </a:lnTo>
+                <a:close/>
+                <a:moveTo>
+                  <a:pt x="55324" y="95713"/>
+                </a:moveTo>
+                <a:lnTo>
+                  <a:pt x="55052" y="98971"/>
+                </a:lnTo>
+                <a:lnTo>
+                  <a:pt x="54713" y="102297"/>
+                </a:lnTo>
+                <a:lnTo>
+                  <a:pt x="54374" y="105284"/>
+                </a:lnTo>
+                <a:lnTo>
+                  <a:pt x="53966" y="107388"/>
+                </a:lnTo>
+                <a:lnTo>
+                  <a:pt x="53763" y="108203"/>
+                </a:lnTo>
+                <a:lnTo>
+                  <a:pt x="53627" y="108746"/>
+                </a:lnTo>
+                <a:lnTo>
+                  <a:pt x="53423" y="109153"/>
+                </a:lnTo>
+                <a:lnTo>
+                  <a:pt x="53220" y="109357"/>
+                </a:lnTo>
+                <a:lnTo>
+                  <a:pt x="52677" y="109493"/>
+                </a:lnTo>
+                <a:lnTo>
+                  <a:pt x="51794" y="109696"/>
+                </a:lnTo>
+                <a:lnTo>
+                  <a:pt x="49690" y="110036"/>
+                </a:lnTo>
+                <a:lnTo>
+                  <a:pt x="48061" y="110307"/>
+                </a:lnTo>
+                <a:lnTo>
+                  <a:pt x="47450" y="110443"/>
+                </a:lnTo>
+                <a:lnTo>
+                  <a:pt x="47110" y="110511"/>
+                </a:lnTo>
+                <a:lnTo>
+                  <a:pt x="47042" y="110579"/>
+                </a:lnTo>
+                <a:lnTo>
+                  <a:pt x="47042" y="110783"/>
+                </a:lnTo>
+                <a:lnTo>
+                  <a:pt x="47110" y="110850"/>
+                </a:lnTo>
+                <a:lnTo>
+                  <a:pt x="47585" y="110918"/>
+                </a:lnTo>
+                <a:lnTo>
+                  <a:pt x="48400" y="110986"/>
+                </a:lnTo>
+                <a:lnTo>
+                  <a:pt x="51387" y="111054"/>
+                </a:lnTo>
+                <a:lnTo>
+                  <a:pt x="56071" y="111122"/>
+                </a:lnTo>
+                <a:lnTo>
+                  <a:pt x="87092" y="111122"/>
+                </a:lnTo>
+                <a:lnTo>
+                  <a:pt x="91708" y="111054"/>
+                </a:lnTo>
+                <a:lnTo>
+                  <a:pt x="94695" y="110986"/>
+                </a:lnTo>
+                <a:lnTo>
+                  <a:pt x="95578" y="110918"/>
+                </a:lnTo>
+                <a:lnTo>
+                  <a:pt x="96053" y="110850"/>
+                </a:lnTo>
+                <a:lnTo>
+                  <a:pt x="96121" y="110783"/>
+                </a:lnTo>
+                <a:lnTo>
+                  <a:pt x="96121" y="110579"/>
+                </a:lnTo>
+                <a:lnTo>
+                  <a:pt x="96053" y="110511"/>
+                </a:lnTo>
+                <a:lnTo>
+                  <a:pt x="95713" y="110443"/>
+                </a:lnTo>
+                <a:lnTo>
+                  <a:pt x="95102" y="110307"/>
+                </a:lnTo>
+                <a:lnTo>
+                  <a:pt x="93473" y="110036"/>
+                </a:lnTo>
+                <a:lnTo>
+                  <a:pt x="91369" y="109696"/>
+                </a:lnTo>
+                <a:lnTo>
+                  <a:pt x="90487" y="109493"/>
+                </a:lnTo>
+                <a:lnTo>
+                  <a:pt x="89943" y="109357"/>
+                </a:lnTo>
+                <a:lnTo>
+                  <a:pt x="89740" y="109153"/>
+                </a:lnTo>
+                <a:lnTo>
+                  <a:pt x="89536" y="108746"/>
+                </a:lnTo>
+                <a:lnTo>
+                  <a:pt x="89333" y="108203"/>
+                </a:lnTo>
+                <a:lnTo>
+                  <a:pt x="89197" y="107388"/>
+                </a:lnTo>
+                <a:lnTo>
+                  <a:pt x="88789" y="105284"/>
+                </a:lnTo>
+                <a:lnTo>
+                  <a:pt x="88382" y="102297"/>
+                </a:lnTo>
+                <a:lnTo>
+                  <a:pt x="88043" y="98971"/>
+                </a:lnTo>
+                <a:lnTo>
+                  <a:pt x="87839" y="95713"/>
+                </a:lnTo>
+                <a:close/>
+                <a:moveTo>
+                  <a:pt x="47450" y="111054"/>
+                </a:moveTo>
+                <a:lnTo>
+                  <a:pt x="47450" y="111122"/>
+                </a:lnTo>
+                <a:lnTo>
+                  <a:pt x="47450" y="111393"/>
+                </a:lnTo>
+                <a:lnTo>
+                  <a:pt x="47518" y="111461"/>
+                </a:lnTo>
+                <a:lnTo>
+                  <a:pt x="48807" y="111529"/>
+                </a:lnTo>
+                <a:lnTo>
+                  <a:pt x="52473" y="111597"/>
+                </a:lnTo>
+                <a:lnTo>
+                  <a:pt x="62384" y="111665"/>
+                </a:lnTo>
+                <a:lnTo>
+                  <a:pt x="80779" y="111665"/>
+                </a:lnTo>
+                <a:lnTo>
+                  <a:pt x="90622" y="111597"/>
+                </a:lnTo>
+                <a:lnTo>
+                  <a:pt x="94356" y="111529"/>
+                </a:lnTo>
+                <a:lnTo>
+                  <a:pt x="95646" y="111461"/>
+                </a:lnTo>
+                <a:lnTo>
+                  <a:pt x="95713" y="111393"/>
+                </a:lnTo>
+                <a:lnTo>
+                  <a:pt x="95713" y="111122"/>
+                </a:lnTo>
+                <a:lnTo>
+                  <a:pt x="95646" y="111054"/>
+                </a:lnTo>
+                <a:lnTo>
+                  <a:pt x="94084" y="111122"/>
+                </a:lnTo>
+                <a:lnTo>
+                  <a:pt x="91233" y="111190"/>
+                </a:lnTo>
+                <a:lnTo>
+                  <a:pt x="80847" y="111258"/>
+                </a:lnTo>
+                <a:lnTo>
+                  <a:pt x="62316" y="111258"/>
+                </a:lnTo>
+                <a:lnTo>
+                  <a:pt x="51930" y="111190"/>
+                </a:lnTo>
+                <a:lnTo>
+                  <a:pt x="49079" y="111122"/>
+                </a:lnTo>
+                <a:lnTo>
+                  <a:pt x="47518" y="111054"/>
+                </a:lnTo>
+                <a:close/>
+              </a:path>
+            </a:pathLst>
+          </a:custGeom>
+          <a:solidFill>
+            <a:schemeClr val="dk1"/>
+          </a:solidFill>
+          <a:ln>
+            <a:noFill/>
+          </a:ln>
+        </p:spPr>
+        <p:txBody>
+          <a:bodyPr spcFirstLastPara="1" wrap="square" lIns="91425" tIns="91425" rIns="91425" bIns="91425" anchor="ctr" anchorCtr="0">
+            <a:noAutofit/>
+          </a:bodyPr>
+          <a:lstStyle/>
+          <a:p>
+            <a:pPr marL="0" lvl="0" indent="0" algn="l" rtl="0">
+              <a:spcBef>
+                <a:spcPts val="0"/>
+              </a:spcBef>
+              <a:spcAft>
+                <a:spcPts val="0"/>
+              </a:spcAft>
+              <a:buNone/>
+            </a:pPr>
+            <a:endParaRPr/>
+          </a:p>
+        </p:txBody>
+      </p:sp>
+      <p:pic>
+        <p:nvPicPr>
+          <p:cNvPr id="3" name="Picture 2">
+            <a:extLst>
+              <a:ext uri="{FF2B5EF4-FFF2-40B4-BE49-F238E27FC236}">
+                <a16:creationId xmlns:a16="http://schemas.microsoft.com/office/drawing/2014/main" id="{6BAED043-40F9-4689-9B30-7D64FF2AD258}"/>
+              </a:ext>
+            </a:extLst>
+          </p:cNvPr>
+          <p:cNvPicPr>
+            <a:picLocks noChangeAspect="1"/>
+          </p:cNvPicPr>
+          <p:nvPr/>
+        </p:nvPicPr>
+        <p:blipFill>
+          <a:blip r:embed="rId3"/>
+          <a:stretch>
+            <a:fillRect/>
+          </a:stretch>
+        </p:blipFill>
+        <p:spPr>
+          <a:xfrm>
+            <a:off x="1489116" y="697716"/>
+            <a:ext cx="5926201" cy="3300281"/>
           </a:xfrm>
           <a:prstGeom prst="rect">
             <a:avLst/>
           </a:prstGeom>
         </p:spPr>
-        <p:txBody>
-          <a:bodyPr spcFirstLastPara="1" wrap="square" lIns="91425" tIns="91425" rIns="91425" bIns="91425" anchor="b" anchorCtr="0">
-            <a:noAutofit/>
-          </a:bodyPr>
-          <a:lstStyle/>
-          <a:p>
-            <a:pPr marL="0" lvl="0" indent="0" algn="l" rtl="0">
-              <a:spcBef>
-                <a:spcPts val="0"/>
-              </a:spcBef>
-              <a:spcAft>
-                <a:spcPts val="0"/>
-              </a:spcAft>
-              <a:buNone/>
-            </a:pPr>
-            <a:r>
-              <a:rPr lang="es-CO" dirty="0"/>
-              <a:t>Diagrama de casos de uso</a:t>
-            </a:r>
-            <a:endParaRPr dirty="0"/>
-          </a:p>
-        </p:txBody>
-      </p:sp>
-      <p:sp>
-        <p:nvSpPr>
-          <p:cNvPr id="131" name="Google Shape;131;p24"/>
-          <p:cNvSpPr txBox="1">
-            <a:spLocks noGrp="1"/>
-          </p:cNvSpPr>
-          <p:nvPr>
-            <p:ph type="body" idx="1"/>
-          </p:nvPr>
-        </p:nvSpPr>
-        <p:spPr>
-          <a:xfrm>
-            <a:off x="561950" y="1880794"/>
-            <a:ext cx="8020200" cy="2815200"/>
-          </a:xfrm>
-          <a:prstGeom prst="rect">
-            <a:avLst/>
-          </a:prstGeom>
-        </p:spPr>
-        <p:txBody>
-          <a:bodyPr spcFirstLastPara="1" wrap="square" lIns="91425" tIns="91425" rIns="91425" bIns="91425" anchor="t" anchorCtr="0">
-            <a:noAutofit/>
-          </a:bodyPr>
-          <a:lstStyle/>
-          <a:p>
-            <a:pPr marL="457200" lvl="0" indent="-355600" algn="l" rtl="0">
-              <a:spcBef>
-                <a:spcPts val="600"/>
-              </a:spcBef>
-              <a:spcAft>
-                <a:spcPts val="0"/>
-              </a:spcAft>
-              <a:buSzPts val="2000"/>
-              <a:buChar char="○"/>
-            </a:pPr>
-            <a:r>
-              <a:rPr lang="en" dirty="0"/>
-              <a:t>Here you have a list of items</a:t>
-            </a:r>
-            <a:endParaRPr dirty="0"/>
-          </a:p>
-          <a:p>
-            <a:pPr marL="457200" lvl="0" indent="-355600" algn="l" rtl="0">
-              <a:spcBef>
-                <a:spcPts val="0"/>
-              </a:spcBef>
-              <a:spcAft>
-                <a:spcPts val="0"/>
-              </a:spcAft>
-              <a:buSzPts val="2000"/>
-              <a:buChar char="○"/>
-            </a:pPr>
-            <a:r>
-              <a:rPr lang="en" dirty="0"/>
-              <a:t>And some text</a:t>
-            </a:r>
-            <a:endParaRPr dirty="0"/>
-          </a:p>
-          <a:p>
-            <a:pPr marL="457200" lvl="0" indent="-355600" algn="l" rtl="0">
-              <a:spcBef>
-                <a:spcPts val="0"/>
-              </a:spcBef>
-              <a:spcAft>
-                <a:spcPts val="0"/>
-              </a:spcAft>
-              <a:buSzPts val="2000"/>
-              <a:buChar char="○"/>
-            </a:pPr>
-            <a:r>
-              <a:rPr lang="en" dirty="0"/>
-              <a:t>But remember not to overload your slides with content</a:t>
-            </a:r>
-            <a:endParaRPr dirty="0"/>
-          </a:p>
-          <a:p>
-            <a:pPr marL="0" lvl="0" indent="0" algn="l" rtl="0">
-              <a:spcBef>
-                <a:spcPts val="600"/>
-              </a:spcBef>
-              <a:spcAft>
-                <a:spcPts val="0"/>
-              </a:spcAft>
-              <a:buNone/>
-            </a:pPr>
-            <a:endParaRPr dirty="0"/>
-          </a:p>
-          <a:p>
-            <a:pPr marL="0" lvl="0" indent="0" algn="l" rtl="0">
-              <a:spcBef>
-                <a:spcPts val="600"/>
-              </a:spcBef>
-              <a:spcAft>
-                <a:spcPts val="0"/>
-              </a:spcAft>
-              <a:buNone/>
-            </a:pPr>
-            <a:r>
-              <a:rPr lang="en" dirty="0"/>
-              <a:t>Your audience will listen to you or read the content, but won’t do both. </a:t>
-            </a:r>
-            <a:endParaRPr dirty="0"/>
-          </a:p>
-        </p:txBody>
-      </p:sp>
-      <p:sp>
-        <p:nvSpPr>
-          <p:cNvPr id="132" name="Google Shape;132;p24"/>
-          <p:cNvSpPr txBox="1">
-            <a:spLocks noGrp="1"/>
-          </p:cNvSpPr>
-          <p:nvPr>
-            <p:ph type="sldNum" idx="12"/>
-          </p:nvPr>
-        </p:nvSpPr>
-        <p:spPr>
-          <a:xfrm>
-            <a:off x="8556775" y="4777350"/>
-            <a:ext cx="548700" cy="290100"/>
-          </a:xfrm>
-          <a:prstGeom prst="rect">
-            <a:avLst/>
-          </a:prstGeom>
-        </p:spPr>
-        <p:txBody>
-          <a:bodyPr spcFirstLastPara="1" wrap="square" lIns="91425" tIns="91425" rIns="91425" bIns="91425" anchor="t" anchorCtr="0">
-            <a:noAutofit/>
-          </a:bodyPr>
-          <a:lstStyle/>
-          <a:p>
-            <a:pPr marL="0" lvl="0" indent="0" algn="r" rtl="0">
-              <a:spcBef>
-                <a:spcPts val="0"/>
-              </a:spcBef>
-              <a:spcAft>
-                <a:spcPts val="0"/>
-              </a:spcAft>
-              <a:buNone/>
-            </a:pPr>
-            <a:fld id="{00000000-1234-1234-1234-123412341234}" type="slidenum">
-              <a:rPr lang="en"/>
-              <a:t>7</a:t>
-            </a:fld>
-            <a:endParaRPr/>
-          </a:p>
-        </p:txBody>
-      </p:sp>
+      </p:pic>
     </p:spTree>
-    <p:extLst>
-      <p:ext uri="{BB962C8B-B14F-4D97-AF65-F5344CB8AC3E}">
-        <p14:creationId xmlns:p14="http://schemas.microsoft.com/office/powerpoint/2010/main" val="625248689"/>
-      </p:ext>
-    </p:extLst>
   </p:cSld>
   <p:clrMapOvr>
     <a:masterClrMapping/>
@@ -7444,8 +8454,8 @@
         </p:nvSpPr>
         <p:spPr>
           <a:xfrm>
-            <a:off x="1489116" y="488137"/>
-            <a:ext cx="6165768" cy="4364739"/>
+            <a:off x="1148006" y="488137"/>
+            <a:ext cx="6506878" cy="4364739"/>
           </a:xfrm>
           <a:custGeom>
             <a:avLst/>
@@ -7875,10 +8885,10 @@
       </p:sp>
       <p:pic>
         <p:nvPicPr>
-          <p:cNvPr id="19" name="Imagen 18">
+          <p:cNvPr id="64" name="Imagen 63">
             <a:extLst>
               <a:ext uri="{FF2B5EF4-FFF2-40B4-BE49-F238E27FC236}">
-                <a16:creationId xmlns:a16="http://schemas.microsoft.com/office/drawing/2014/main" id="{F7B7EBB0-8F01-4A2C-9AE1-7AEE6DCCCAC6}"/>
+                <a16:creationId xmlns:a16="http://schemas.microsoft.com/office/drawing/2014/main" id="{085B8A0D-B499-40F7-8A8B-69E41F104644}"/>
               </a:ext>
             </a:extLst>
           </p:cNvPr>
@@ -7887,16 +8897,15 @@
           </p:cNvPicPr>
           <p:nvPr/>
         </p:nvPicPr>
-        <p:blipFill>
+        <p:blipFill rotWithShape="1">
           <a:blip r:embed="rId3"/>
-          <a:stretch>
-            <a:fillRect/>
-          </a:stretch>
+          <a:srcRect l="1082" t="3659" r="1575" b="2312"/>
+          <a:stretch/>
         </p:blipFill>
         <p:spPr>
           <a:xfrm>
-            <a:off x="1734170" y="721862"/>
-            <a:ext cx="5666090" cy="3289374"/>
+            <a:off x="1414985" y="723013"/>
+            <a:ext cx="5999452" cy="3260652"/>
           </a:xfrm>
           <a:prstGeom prst="rect">
             <a:avLst/>
@@ -7904,6 +8913,11 @@
         </p:spPr>
       </p:pic>
     </p:spTree>
+    <p:extLst>
+      <p:ext uri="{BB962C8B-B14F-4D97-AF65-F5344CB8AC3E}">
+        <p14:creationId xmlns:p14="http://schemas.microsoft.com/office/powerpoint/2010/main" val="2561132786"/>
+      </p:ext>
+    </p:extLst>
   </p:cSld>
   <p:clrMapOvr>
     <a:masterClrMapping/>
@@ -7942,8 +8956,8 @@
         </p:nvSpPr>
         <p:spPr>
           <a:xfrm>
-            <a:off x="1489116" y="488137"/>
-            <a:ext cx="6165768" cy="4364739"/>
+            <a:off x="1148006" y="488137"/>
+            <a:ext cx="6506878" cy="4364739"/>
           </a:xfrm>
           <a:custGeom>
             <a:avLst/>
@@ -8373,10 +9387,10 @@
       </p:sp>
       <p:pic>
         <p:nvPicPr>
-          <p:cNvPr id="64" name="Imagen 63">
+          <p:cNvPr id="2" name="Picture 1">
             <a:extLst>
               <a:ext uri="{FF2B5EF4-FFF2-40B4-BE49-F238E27FC236}">
-                <a16:creationId xmlns:a16="http://schemas.microsoft.com/office/drawing/2014/main" id="{085B8A0D-B499-40F7-8A8B-69E41F104644}"/>
+                <a16:creationId xmlns:a16="http://schemas.microsoft.com/office/drawing/2014/main" id="{D2EA280C-2153-4E3B-83C3-F05C0603D3A9}"/>
               </a:ext>
             </a:extLst>
           </p:cNvPr>
@@ -8387,13 +9401,13 @@
         </p:nvPicPr>
         <p:blipFill rotWithShape="1">
           <a:blip r:embed="rId3"/>
-          <a:srcRect l="1082" t="3659" r="1575" b="2312"/>
+          <a:srcRect t="-1" b="-1396"/>
           <a:stretch/>
         </p:blipFill>
         <p:spPr>
           <a:xfrm>
-            <a:off x="1715385" y="723013"/>
-            <a:ext cx="5699051" cy="3260652"/>
+            <a:off x="1391993" y="720839"/>
+            <a:ext cx="5996626" cy="3317405"/>
           </a:xfrm>
           <a:prstGeom prst="rect">
             <a:avLst/>
@@ -8403,7 +9417,7 @@
     </p:spTree>
     <p:extLst>
       <p:ext uri="{BB962C8B-B14F-4D97-AF65-F5344CB8AC3E}">
-        <p14:creationId xmlns:p14="http://schemas.microsoft.com/office/powerpoint/2010/main" val="2561132786"/>
+        <p14:creationId xmlns:p14="http://schemas.microsoft.com/office/powerpoint/2010/main" val="3206927205"/>
       </p:ext>
     </p:extLst>
   </p:cSld>
@@ -8976,6 +9990,15 @@
 </file>
 
 <file path=customXml/item1.xml><?xml version="1.0" encoding="utf-8"?>
+<?mso-contentType ?>
+<FormTemplates xmlns="http://schemas.microsoft.com/sharepoint/v3/contenttype/forms">
+  <Display>DocumentLibraryForm</Display>
+  <Edit>DocumentLibraryForm</Edit>
+  <New>DocumentLibraryForm</New>
+</FormTemplates>
+</file>
+
+<file path=customXml/item2.xml><?xml version="1.0" encoding="utf-8"?>
 <ct:contentTypeSchema xmlns:ct="http://schemas.microsoft.com/office/2006/metadata/contentType" xmlns:ma="http://schemas.microsoft.com/office/2006/metadata/properties/metaAttributes" ct:_="" ma:_="" ma:contentTypeName="Document" ma:contentTypeID="0x010100C089011499791B4EB69D0A56FFA67F2B" ma:contentTypeVersion="13" ma:contentTypeDescription="Create a new document." ma:contentTypeScope="" ma:versionID="26b94e86fe441b87730bf38c404cad9c">
   <xsd:schema xmlns:xsd="http://www.w3.org/2001/XMLSchema" xmlns:xs="http://www.w3.org/2001/XMLSchema" xmlns:p="http://schemas.microsoft.com/office/2006/metadata/properties" xmlns:ns3="bf3e1746-bde1-4d6e-9c3f-7182572f7502" xmlns:ns4="14224164-2045-4b51-92bb-313d0f626d83" targetNamespace="http://schemas.microsoft.com/office/2006/metadata/properties" ma:root="true" ma:fieldsID="fa88938c144dfbd801fe1fb3cb96e918" ns3:_="" ns4:_="">
     <xsd:import namespace="bf3e1746-bde1-4d6e-9c3f-7182572f7502"/>
@@ -9198,15 +10221,6 @@
 </ct:contentTypeSchema>
 </file>
 
-<file path=customXml/item2.xml><?xml version="1.0" encoding="utf-8"?>
-<?mso-contentType ?>
-<FormTemplates xmlns="http://schemas.microsoft.com/sharepoint/v3/contenttype/forms">
-  <Display>DocumentLibraryForm</Display>
-  <Edit>DocumentLibraryForm</Edit>
-  <New>DocumentLibraryForm</New>
-</FormTemplates>
-</file>
-
 <file path=customXml/item3.xml><?xml version="1.0" encoding="utf-8"?>
 <p:properties xmlns:p="http://schemas.microsoft.com/office/2006/metadata/properties" xmlns:xsi="http://www.w3.org/2001/XMLSchema-instance" xmlns:pc="http://schemas.microsoft.com/office/infopath/2007/PartnerControls">
   <documentManagement/>
@@ -9214,6 +10228,14 @@
 </file>
 
 <file path=customXml/itemProps1.xml><?xml version="1.0" encoding="utf-8"?>
+<ds:datastoreItem xmlns:ds="http://schemas.openxmlformats.org/officeDocument/2006/customXml" ds:itemID="{C3DC809E-3B44-42CB-A2F7-7B16DF6ACCA2}">
+  <ds:schemaRefs>
+    <ds:schemaRef ds:uri="http://schemas.microsoft.com/sharepoint/v3/contenttype/forms"/>
+  </ds:schemaRefs>
+</ds:datastoreItem>
+</file>
+
+<file path=customXml/itemProps2.xml><?xml version="1.0" encoding="utf-8"?>
 <ds:datastoreItem xmlns:ds="http://schemas.openxmlformats.org/officeDocument/2006/customXml" ds:itemID="{7EF4917C-04A3-4837-91CB-70409AF87BD8}">
   <ds:schemaRefs>
     <ds:schemaRef ds:uri="http://schemas.microsoft.com/office/2006/metadata/contentType"/>
@@ -9232,14 +10254,6 @@
 </ds:datastoreItem>
 </file>
 
-<file path=customXml/itemProps2.xml><?xml version="1.0" encoding="utf-8"?>
-<ds:datastoreItem xmlns:ds="http://schemas.openxmlformats.org/officeDocument/2006/customXml" ds:itemID="{C3DC809E-3B44-42CB-A2F7-7B16DF6ACCA2}">
-  <ds:schemaRefs>
-    <ds:schemaRef ds:uri="http://schemas.microsoft.com/sharepoint/v3/contenttype/forms"/>
-  </ds:schemaRefs>
-</ds:datastoreItem>
-</file>
-
 <file path=customXml/itemProps3.xml><?xml version="1.0" encoding="utf-8"?>
 <ds:datastoreItem xmlns:ds="http://schemas.openxmlformats.org/officeDocument/2006/customXml" ds:itemID="{2DA04665-1809-4A38-BD08-960ED829B85B}">
   <ds:schemaRefs>

</xml_diff>